<commit_message>
update poster and video
</commit_message>
<xml_diff>
--- a/report/posterCS234.pptx
+++ b/report/posterCS234.pptx
@@ -121,10 +121,6 @@
     </p:ext>
   </p:extLst>
 </p:presentation>
-</file>
-
-<file path=ppt/revisionInfo.xml><?xml version="1.0" encoding="utf-8"?>
-<p1510:revInfo xmlns:a="http://schemas.openxmlformats.org/drawingml/2006/main" xmlns:r="http://schemas.openxmlformats.org/officeDocument/2006/relationships" xmlns:p1510="http://schemas.microsoft.com/office/powerpoint/2015/10/main"/>
 </file>
 
 <file path=ppt/slideLayouts/slideLayout1.xml><?xml version="1.0" encoding="utf-8"?>
@@ -2982,7 +2978,7 @@
                 <a:latin typeface="Arial" charset="0"/>
                 <a:ea typeface="ＭＳ Ｐゴシック" charset="-128"/>
               </a:rPr>
-              <a:t>Deep Reinforcement Learning on Playing Atari Game </a:t>
+              <a:t>Double A3C on Playing Atari Game </a:t>
             </a:r>
           </a:p>
           <a:p>
@@ -3060,14 +3056,14 @@
           </a:ln>
           <a:extLst>
             <a:ext uri="{909E8E84-426E-40dd-AFC4-6F175D3DCCD1}">
-              <a14:hiddenFill xmlns="" xmlns:a14="http://schemas.microsoft.com/office/drawing/2010/main">
+              <a14:hiddenFill xmlns:a14="http://schemas.microsoft.com/office/drawing/2010/main" xmlns="">
                 <a:solidFill>
                   <a:srgbClr val="FFFFFF"/>
                 </a:solidFill>
               </a14:hiddenFill>
             </a:ext>
             <a:ext uri="{91240B29-F687-4f45-9708-019B960494DF}">
-              <a14:hiddenLine xmlns="" xmlns:a14="http://schemas.microsoft.com/office/drawing/2010/main" w="9525">
+              <a14:hiddenLine xmlns:a14="http://schemas.microsoft.com/office/drawing/2010/main" xmlns="" w="9525">
                 <a:solidFill>
                   <a:srgbClr val="000000"/>
                 </a:solidFill>
@@ -3088,7 +3084,7 @@
         <p:spPr>
           <a:xfrm>
             <a:off x="263690" y="3447461"/>
-            <a:ext cx="8832541" cy="2917730"/>
+            <a:ext cx="7799395" cy="3111540"/>
           </a:xfrm>
           <a:prstGeom prst="roundRect">
             <a:avLst>
@@ -3131,7 +3127,7 @@
               <a:tabLst/>
               <a:defRPr/>
             </a:pPr>
-            <a:endParaRPr kumimoji="0" lang="en-US" sz="6857" b="0" i="0" u="none" strike="noStrike" kern="0" cap="none" spc="0" normalizeH="0" baseline="0" noProof="0">
+            <a:endParaRPr kumimoji="0" lang="en-US" sz="6857" b="0" i="0" u="none" strike="noStrike" kern="0" cap="none" spc="0" normalizeH="0" baseline="0" noProof="0" dirty="0">
               <a:ln>
                 <a:noFill/>
               </a:ln>
@@ -3158,8 +3154,8 @@
         </p:nvSpPr>
         <p:spPr>
           <a:xfrm>
-            <a:off x="184414" y="6654723"/>
-            <a:ext cx="8750423" cy="772494"/>
+            <a:off x="184415" y="6654723"/>
+            <a:ext cx="7963894" cy="772494"/>
           </a:xfrm>
           <a:prstGeom prst="rect">
             <a:avLst/>
@@ -3404,7 +3400,7 @@
         <p:spPr>
           <a:xfrm>
             <a:off x="263691" y="3509479"/>
-            <a:ext cx="8615456" cy="737693"/>
+            <a:ext cx="7799394" cy="737693"/>
           </a:xfrm>
           <a:prstGeom prst="rect">
             <a:avLst/>
@@ -3612,28 +3608,21 @@
               <a:defRPr/>
             </a:pPr>
             <a:r>
-              <a:rPr lang="en-US" sz="4000" spc="300">
+              <a:rPr lang="en-US" sz="4000" spc="300" dirty="0">
                 <a:solidFill>
                   <a:srgbClr val="8C1515"/>
                 </a:solidFill>
                 <a:ea typeface=""/>
                 <a:cs typeface=""/>
               </a:rPr>
-              <a:t>Text</a:t>
-            </a:r>
-            <a:endParaRPr lang="en-US" sz="4000" spc="300" dirty="0">
-              <a:solidFill>
-                <a:srgbClr val="8C1515"/>
-              </a:solidFill>
-              <a:ea typeface=""/>
-              <a:cs typeface=""/>
-            </a:endParaRPr>
-          </a:p>
-        </p:txBody>
-      </p:sp>
-      <p:sp>
-        <p:nvSpPr>
-          <p:cNvPr id="29" name="Subtitle 3"/>
+              <a:t>Motivation</a:t>
+            </a:r>
+          </a:p>
+        </p:txBody>
+      </p:sp>
+      <p:sp>
+        <p:nvSpPr>
+          <p:cNvPr id="30" name="Subtitle 3"/>
           <p:cNvSpPr txBox="1">
             <a:spLocks/>
           </p:cNvSpPr>
@@ -3641,8 +3630,8 @@
         </p:nvSpPr>
         <p:spPr>
           <a:xfrm>
-            <a:off x="9528439" y="7585587"/>
-            <a:ext cx="8704048" cy="906936"/>
+            <a:off x="221455" y="15785168"/>
+            <a:ext cx="7860236" cy="637648"/>
           </a:xfrm>
           <a:prstGeom prst="rect">
             <a:avLst/>
@@ -3857,14 +3846,14 @@
                 <a:ea typeface=""/>
                 <a:cs typeface=""/>
               </a:rPr>
-              <a:t>Text</a:t>
-            </a:r>
-          </a:p>
-        </p:txBody>
-      </p:sp>
-      <p:sp>
-        <p:nvSpPr>
-          <p:cNvPr id="30" name="Subtitle 3"/>
+              <a:t>Challenge</a:t>
+            </a:r>
+          </a:p>
+        </p:txBody>
+      </p:sp>
+      <p:sp>
+        <p:nvSpPr>
+          <p:cNvPr id="31" name="Subtitle 3"/>
           <p:cNvSpPr txBox="1">
             <a:spLocks/>
           </p:cNvSpPr>
@@ -3872,8 +3861,8 @@
         </p:nvSpPr>
         <p:spPr>
           <a:xfrm>
-            <a:off x="290438" y="14977321"/>
-            <a:ext cx="8750423" cy="637648"/>
+            <a:off x="20822482" y="10215395"/>
+            <a:ext cx="6374685" cy="840007"/>
           </a:xfrm>
           <a:prstGeom prst="rect">
             <a:avLst/>
@@ -4088,469 +4077,7 @@
                 <a:ea typeface=""/>
                 <a:cs typeface=""/>
               </a:rPr>
-              <a:t>Text</a:t>
-            </a:r>
-          </a:p>
-        </p:txBody>
-      </p:sp>
-      <p:sp>
-        <p:nvSpPr>
-          <p:cNvPr id="31" name="Subtitle 3"/>
-          <p:cNvSpPr txBox="1">
-            <a:spLocks/>
-          </p:cNvSpPr>
-          <p:nvPr/>
-        </p:nvSpPr>
-        <p:spPr>
-          <a:xfrm>
-            <a:off x="18392712" y="11890674"/>
-            <a:ext cx="8710783" cy="840007"/>
-          </a:xfrm>
-          <a:prstGeom prst="rect">
-            <a:avLst/>
-          </a:prstGeom>
-        </p:spPr>
-        <p:txBody>
-          <a:bodyPr vert="horz" wrap="square" lIns="0" tIns="45720" rIns="0" bIns="45720" rtlCol="0">
-            <a:noAutofit/>
-          </a:bodyPr>
-          <a:lstStyle>
-            <a:lvl1pPr marL="0" indent="0" algn="ctr" defTabSz="1219215" rtl="0" eaLnBrk="1" fontAlgn="base" hangingPunct="1">
-              <a:spcBef>
-                <a:spcPct val="20000"/>
-              </a:spcBef>
-              <a:spcAft>
-                <a:spcPct val="0"/>
-              </a:spcAft>
-              <a:buClr>
-                <a:schemeClr val="bg2"/>
-              </a:buClr>
-              <a:buFont typeface="Wingdings" charset="2"/>
-              <a:buNone/>
-              <a:defRPr sz="5333" kern="1200" cap="small" spc="800">
-                <a:solidFill>
-                  <a:srgbClr val="A4001D"/>
-                </a:solidFill>
-                <a:latin typeface="Arial"/>
-                <a:ea typeface="ＭＳ Ｐゴシック" charset="0"/>
-                <a:cs typeface="ＭＳ Ｐゴシック" charset="0"/>
-              </a:defRPr>
-            </a:lvl1pPr>
-            <a:lvl2pPr marL="1219215" indent="0" algn="ctr" defTabSz="1219215" rtl="0" eaLnBrk="1" fontAlgn="base" hangingPunct="1">
-              <a:spcBef>
-                <a:spcPct val="20000"/>
-              </a:spcBef>
-              <a:spcAft>
-                <a:spcPct val="0"/>
-              </a:spcAft>
-              <a:buClr>
-                <a:schemeClr val="bg2"/>
-              </a:buClr>
-              <a:buFont typeface="Wingdings" charset="2"/>
-              <a:buNone/>
-              <a:defRPr kern="1200">
-                <a:solidFill>
-                  <a:schemeClr val="tx1">
-                    <a:tint val="75000"/>
-                  </a:schemeClr>
-                </a:solidFill>
-                <a:latin typeface="Arial"/>
-                <a:ea typeface="ＭＳ Ｐゴシック" charset="0"/>
-                <a:cs typeface="+mn-cs"/>
-              </a:defRPr>
-            </a:lvl2pPr>
-            <a:lvl3pPr marL="2438430" indent="0" algn="ctr" defTabSz="1219215" rtl="0" eaLnBrk="1" fontAlgn="base" hangingPunct="1">
-              <a:spcBef>
-                <a:spcPct val="20000"/>
-              </a:spcBef>
-              <a:spcAft>
-                <a:spcPct val="0"/>
-              </a:spcAft>
-              <a:buClr>
-                <a:schemeClr val="bg2"/>
-              </a:buClr>
-              <a:buSzPct val="102000"/>
-              <a:buFont typeface="Source Sans Pro" charset="0"/>
-              <a:buNone/>
-              <a:defRPr kern="1200">
-                <a:solidFill>
-                  <a:schemeClr val="tx1">
-                    <a:tint val="75000"/>
-                  </a:schemeClr>
-                </a:solidFill>
-                <a:latin typeface="Arial"/>
-                <a:ea typeface="ＭＳ Ｐゴシック" charset="0"/>
-                <a:cs typeface="+mn-cs"/>
-              </a:defRPr>
-            </a:lvl3pPr>
-            <a:lvl4pPr marL="3657646" indent="0" algn="ctr" defTabSz="1219215" rtl="0" eaLnBrk="1" fontAlgn="base" hangingPunct="1">
-              <a:spcBef>
-                <a:spcPct val="20000"/>
-              </a:spcBef>
-              <a:spcAft>
-                <a:spcPct val="0"/>
-              </a:spcAft>
-              <a:buClr>
-                <a:schemeClr val="bg2"/>
-              </a:buClr>
-              <a:buFont typeface="Arial" charset="0"/>
-              <a:buNone/>
-              <a:defRPr kern="1200">
-                <a:solidFill>
-                  <a:schemeClr val="tx1">
-                    <a:tint val="75000"/>
-                  </a:schemeClr>
-                </a:solidFill>
-                <a:latin typeface="Arial"/>
-                <a:ea typeface="ＭＳ Ｐゴシック" charset="0"/>
-                <a:cs typeface="+mn-cs"/>
-              </a:defRPr>
-            </a:lvl4pPr>
-            <a:lvl5pPr marL="4876861" indent="0" algn="ctr" defTabSz="1219215" rtl="0" eaLnBrk="1" fontAlgn="base" hangingPunct="1">
-              <a:spcBef>
-                <a:spcPct val="20000"/>
-              </a:spcBef>
-              <a:spcAft>
-                <a:spcPct val="0"/>
-              </a:spcAft>
-              <a:buClr>
-                <a:schemeClr val="bg2"/>
-              </a:buClr>
-              <a:buFont typeface="Source Sans Pro" charset="0"/>
-              <a:buNone/>
-              <a:defRPr kern="1200">
-                <a:solidFill>
-                  <a:schemeClr val="tx1">
-                    <a:tint val="75000"/>
-                  </a:schemeClr>
-                </a:solidFill>
-                <a:latin typeface="Arial"/>
-                <a:ea typeface="ＭＳ Ｐゴシック" charset="0"/>
-                <a:cs typeface="+mn-cs"/>
-              </a:defRPr>
-            </a:lvl5pPr>
-            <a:lvl6pPr marL="6096076" indent="0" algn="ctr" defTabSz="1219215" rtl="0" eaLnBrk="1" latinLnBrk="0" hangingPunct="1">
-              <a:spcBef>
-                <a:spcPct val="20000"/>
-              </a:spcBef>
-              <a:buFont typeface="Arial"/>
-              <a:buNone/>
-              <a:defRPr sz="5333" kern="1200">
-                <a:solidFill>
-                  <a:schemeClr val="tx1">
-                    <a:tint val="75000"/>
-                  </a:schemeClr>
-                </a:solidFill>
-                <a:latin typeface="+mn-lt"/>
-                <a:ea typeface="+mn-ea"/>
-                <a:cs typeface="+mn-cs"/>
-              </a:defRPr>
-            </a:lvl6pPr>
-            <a:lvl7pPr marL="7315291" indent="0" algn="ctr" defTabSz="1219215" rtl="0" eaLnBrk="1" latinLnBrk="0" hangingPunct="1">
-              <a:spcBef>
-                <a:spcPct val="20000"/>
-              </a:spcBef>
-              <a:buFont typeface="Arial"/>
-              <a:buNone/>
-              <a:defRPr sz="5333" kern="1200">
-                <a:solidFill>
-                  <a:schemeClr val="tx1">
-                    <a:tint val="75000"/>
-                  </a:schemeClr>
-                </a:solidFill>
-                <a:latin typeface="+mn-lt"/>
-                <a:ea typeface="+mn-ea"/>
-                <a:cs typeface="+mn-cs"/>
-              </a:defRPr>
-            </a:lvl7pPr>
-            <a:lvl8pPr marL="8534507" indent="0" algn="ctr" defTabSz="1219215" rtl="0" eaLnBrk="1" latinLnBrk="0" hangingPunct="1">
-              <a:spcBef>
-                <a:spcPct val="20000"/>
-              </a:spcBef>
-              <a:buFont typeface="Arial"/>
-              <a:buNone/>
-              <a:defRPr sz="5333" kern="1200">
-                <a:solidFill>
-                  <a:schemeClr val="tx1">
-                    <a:tint val="75000"/>
-                  </a:schemeClr>
-                </a:solidFill>
-                <a:latin typeface="+mn-lt"/>
-                <a:ea typeface="+mn-ea"/>
-                <a:cs typeface="+mn-cs"/>
-              </a:defRPr>
-            </a:lvl8pPr>
-            <a:lvl9pPr marL="9753722" indent="0" algn="ctr" defTabSz="1219215" rtl="0" eaLnBrk="1" latinLnBrk="0" hangingPunct="1">
-              <a:spcBef>
-                <a:spcPct val="20000"/>
-              </a:spcBef>
-              <a:buFont typeface="Arial"/>
-              <a:buNone/>
-              <a:defRPr sz="5333" kern="1200">
-                <a:solidFill>
-                  <a:schemeClr val="tx1">
-                    <a:tint val="75000"/>
-                  </a:schemeClr>
-                </a:solidFill>
-                <a:latin typeface="+mn-lt"/>
-                <a:ea typeface="+mn-ea"/>
-                <a:cs typeface="+mn-cs"/>
-              </a:defRPr>
-            </a:lvl9pPr>
-          </a:lstStyle>
-          <a:p>
-            <a:pPr fontAlgn="auto">
-              <a:spcBef>
-                <a:spcPts val="600"/>
-              </a:spcBef>
-              <a:spcAft>
-                <a:spcPts val="0"/>
-              </a:spcAft>
-              <a:buClr>
-                <a:srgbClr val="8C1515"/>
-              </a:buClr>
-              <a:defRPr/>
-            </a:pPr>
-            <a:r>
-              <a:rPr lang="en-US" sz="4000" spc="300" dirty="0">
-                <a:solidFill>
-                  <a:srgbClr val="8C1515"/>
-                </a:solidFill>
-                <a:ea typeface=""/>
-                <a:cs typeface=""/>
-              </a:rPr>
-              <a:t>text</a:t>
-            </a:r>
-          </a:p>
-        </p:txBody>
-      </p:sp>
-      <p:sp>
-        <p:nvSpPr>
-          <p:cNvPr id="32" name="Subtitle 3"/>
-          <p:cNvSpPr txBox="1">
-            <a:spLocks/>
-          </p:cNvSpPr>
-          <p:nvPr/>
-        </p:nvSpPr>
-        <p:spPr>
-          <a:xfrm>
-            <a:off x="18392713" y="3540138"/>
-            <a:ext cx="8710782" cy="1010893"/>
-          </a:xfrm>
-          <a:prstGeom prst="rect">
-            <a:avLst/>
-          </a:prstGeom>
-        </p:spPr>
-        <p:txBody>
-          <a:bodyPr vert="horz" wrap="square" lIns="0" tIns="45720" rIns="0" bIns="45720" rtlCol="0">
-            <a:noAutofit/>
-          </a:bodyPr>
-          <a:lstStyle>
-            <a:lvl1pPr marL="0" indent="0" algn="ctr" defTabSz="1219215" rtl="0" eaLnBrk="1" fontAlgn="base" hangingPunct="1">
-              <a:spcBef>
-                <a:spcPct val="20000"/>
-              </a:spcBef>
-              <a:spcAft>
-                <a:spcPct val="0"/>
-              </a:spcAft>
-              <a:buClr>
-                <a:schemeClr val="bg2"/>
-              </a:buClr>
-              <a:buFont typeface="Wingdings" charset="2"/>
-              <a:buNone/>
-              <a:defRPr sz="5333" kern="1200" cap="small" spc="800">
-                <a:solidFill>
-                  <a:srgbClr val="A4001D"/>
-                </a:solidFill>
-                <a:latin typeface="Arial"/>
-                <a:ea typeface="ＭＳ Ｐゴシック" charset="0"/>
-                <a:cs typeface="ＭＳ Ｐゴシック" charset="0"/>
-              </a:defRPr>
-            </a:lvl1pPr>
-            <a:lvl2pPr marL="1219215" indent="0" algn="ctr" defTabSz="1219215" rtl="0" eaLnBrk="1" fontAlgn="base" hangingPunct="1">
-              <a:spcBef>
-                <a:spcPct val="20000"/>
-              </a:spcBef>
-              <a:spcAft>
-                <a:spcPct val="0"/>
-              </a:spcAft>
-              <a:buClr>
-                <a:schemeClr val="bg2"/>
-              </a:buClr>
-              <a:buFont typeface="Wingdings" charset="2"/>
-              <a:buNone/>
-              <a:defRPr kern="1200">
-                <a:solidFill>
-                  <a:schemeClr val="tx1">
-                    <a:tint val="75000"/>
-                  </a:schemeClr>
-                </a:solidFill>
-                <a:latin typeface="Arial"/>
-                <a:ea typeface="ＭＳ Ｐゴシック" charset="0"/>
-                <a:cs typeface="+mn-cs"/>
-              </a:defRPr>
-            </a:lvl2pPr>
-            <a:lvl3pPr marL="2438430" indent="0" algn="ctr" defTabSz="1219215" rtl="0" eaLnBrk="1" fontAlgn="base" hangingPunct="1">
-              <a:spcBef>
-                <a:spcPct val="20000"/>
-              </a:spcBef>
-              <a:spcAft>
-                <a:spcPct val="0"/>
-              </a:spcAft>
-              <a:buClr>
-                <a:schemeClr val="bg2"/>
-              </a:buClr>
-              <a:buSzPct val="102000"/>
-              <a:buFont typeface="Source Sans Pro" charset="0"/>
-              <a:buNone/>
-              <a:defRPr kern="1200">
-                <a:solidFill>
-                  <a:schemeClr val="tx1">
-                    <a:tint val="75000"/>
-                  </a:schemeClr>
-                </a:solidFill>
-                <a:latin typeface="Arial"/>
-                <a:ea typeface="ＭＳ Ｐゴシック" charset="0"/>
-                <a:cs typeface="+mn-cs"/>
-              </a:defRPr>
-            </a:lvl3pPr>
-            <a:lvl4pPr marL="3657646" indent="0" algn="ctr" defTabSz="1219215" rtl="0" eaLnBrk="1" fontAlgn="base" hangingPunct="1">
-              <a:spcBef>
-                <a:spcPct val="20000"/>
-              </a:spcBef>
-              <a:spcAft>
-                <a:spcPct val="0"/>
-              </a:spcAft>
-              <a:buClr>
-                <a:schemeClr val="bg2"/>
-              </a:buClr>
-              <a:buFont typeface="Arial" charset="0"/>
-              <a:buNone/>
-              <a:defRPr kern="1200">
-                <a:solidFill>
-                  <a:schemeClr val="tx1">
-                    <a:tint val="75000"/>
-                  </a:schemeClr>
-                </a:solidFill>
-                <a:latin typeface="Arial"/>
-                <a:ea typeface="ＭＳ Ｐゴシック" charset="0"/>
-                <a:cs typeface="+mn-cs"/>
-              </a:defRPr>
-            </a:lvl4pPr>
-            <a:lvl5pPr marL="4876861" indent="0" algn="ctr" defTabSz="1219215" rtl="0" eaLnBrk="1" fontAlgn="base" hangingPunct="1">
-              <a:spcBef>
-                <a:spcPct val="20000"/>
-              </a:spcBef>
-              <a:spcAft>
-                <a:spcPct val="0"/>
-              </a:spcAft>
-              <a:buClr>
-                <a:schemeClr val="bg2"/>
-              </a:buClr>
-              <a:buFont typeface="Source Sans Pro" charset="0"/>
-              <a:buNone/>
-              <a:defRPr kern="1200">
-                <a:solidFill>
-                  <a:schemeClr val="tx1">
-                    <a:tint val="75000"/>
-                  </a:schemeClr>
-                </a:solidFill>
-                <a:latin typeface="Arial"/>
-                <a:ea typeface="ＭＳ Ｐゴシック" charset="0"/>
-                <a:cs typeface="+mn-cs"/>
-              </a:defRPr>
-            </a:lvl5pPr>
-            <a:lvl6pPr marL="6096076" indent="0" algn="ctr" defTabSz="1219215" rtl="0" eaLnBrk="1" latinLnBrk="0" hangingPunct="1">
-              <a:spcBef>
-                <a:spcPct val="20000"/>
-              </a:spcBef>
-              <a:buFont typeface="Arial"/>
-              <a:buNone/>
-              <a:defRPr sz="5333" kern="1200">
-                <a:solidFill>
-                  <a:schemeClr val="tx1">
-                    <a:tint val="75000"/>
-                  </a:schemeClr>
-                </a:solidFill>
-                <a:latin typeface="+mn-lt"/>
-                <a:ea typeface="+mn-ea"/>
-                <a:cs typeface="+mn-cs"/>
-              </a:defRPr>
-            </a:lvl6pPr>
-            <a:lvl7pPr marL="7315291" indent="0" algn="ctr" defTabSz="1219215" rtl="0" eaLnBrk="1" latinLnBrk="0" hangingPunct="1">
-              <a:spcBef>
-                <a:spcPct val="20000"/>
-              </a:spcBef>
-              <a:buFont typeface="Arial"/>
-              <a:buNone/>
-              <a:defRPr sz="5333" kern="1200">
-                <a:solidFill>
-                  <a:schemeClr val="tx1">
-                    <a:tint val="75000"/>
-                  </a:schemeClr>
-                </a:solidFill>
-                <a:latin typeface="+mn-lt"/>
-                <a:ea typeface="+mn-ea"/>
-                <a:cs typeface="+mn-cs"/>
-              </a:defRPr>
-            </a:lvl7pPr>
-            <a:lvl8pPr marL="8534507" indent="0" algn="ctr" defTabSz="1219215" rtl="0" eaLnBrk="1" latinLnBrk="0" hangingPunct="1">
-              <a:spcBef>
-                <a:spcPct val="20000"/>
-              </a:spcBef>
-              <a:buFont typeface="Arial"/>
-              <a:buNone/>
-              <a:defRPr sz="5333" kern="1200">
-                <a:solidFill>
-                  <a:schemeClr val="tx1">
-                    <a:tint val="75000"/>
-                  </a:schemeClr>
-                </a:solidFill>
-                <a:latin typeface="+mn-lt"/>
-                <a:ea typeface="+mn-ea"/>
-                <a:cs typeface="+mn-cs"/>
-              </a:defRPr>
-            </a:lvl8pPr>
-            <a:lvl9pPr marL="9753722" indent="0" algn="ctr" defTabSz="1219215" rtl="0" eaLnBrk="1" latinLnBrk="0" hangingPunct="1">
-              <a:spcBef>
-                <a:spcPct val="20000"/>
-              </a:spcBef>
-              <a:buFont typeface="Arial"/>
-              <a:buNone/>
-              <a:defRPr sz="5333" kern="1200">
-                <a:solidFill>
-                  <a:schemeClr val="tx1">
-                    <a:tint val="75000"/>
-                  </a:schemeClr>
-                </a:solidFill>
-                <a:latin typeface="+mn-lt"/>
-                <a:ea typeface="+mn-ea"/>
-                <a:cs typeface="+mn-cs"/>
-              </a:defRPr>
-            </a:lvl9pPr>
-          </a:lstStyle>
-          <a:p>
-            <a:pPr fontAlgn="auto">
-              <a:spcBef>
-                <a:spcPts val="600"/>
-              </a:spcBef>
-              <a:spcAft>
-                <a:spcPts val="0"/>
-              </a:spcAft>
-              <a:buClr>
-                <a:srgbClr val="8C1515"/>
-              </a:buClr>
-              <a:defRPr/>
-            </a:pPr>
-            <a:r>
-              <a:rPr lang="en-US" sz="4000" spc="300" dirty="0">
-                <a:solidFill>
-                  <a:srgbClr val="8C1515"/>
-                </a:solidFill>
-                <a:ea typeface=""/>
-                <a:cs typeface=""/>
-              </a:rPr>
-              <a:t>Text</a:t>
+              <a:t>Analysis</a:t>
             </a:r>
           </a:p>
         </p:txBody>
@@ -4563,8 +4090,8 @@
         </p:nvSpPr>
         <p:spPr>
           <a:xfrm>
-            <a:off x="522515" y="4185154"/>
-            <a:ext cx="8412321" cy="477054"/>
+            <a:off x="325868" y="4185154"/>
+            <a:ext cx="7697577" cy="2400657"/>
           </a:xfrm>
           <a:prstGeom prst="rect">
             <a:avLst/>
@@ -4577,15 +4104,13 @@
           </a:bodyPr>
           <a:lstStyle/>
           <a:p>
-            <a:pPr marL="571500" indent="-571500" algn="just" defTabSz="1306266" fontAlgn="base">
+            <a:pPr algn="just" defTabSz="1306266" fontAlgn="base">
               <a:spcBef>
                 <a:spcPct val="0"/>
               </a:spcBef>
               <a:spcAft>
                 <a:spcPct val="0"/>
               </a:spcAft>
-              <a:buFont typeface="Arial" charset="0"/>
-              <a:buChar char="•"/>
             </a:pPr>
             <a:r>
               <a:rPr lang="en-US" sz="2500" dirty="0">
@@ -4596,21 +4121,21 @@
                 <a:ea typeface="Helvetica" charset="0"/>
                 <a:cs typeface="Helvetica" charset="0"/>
               </a:rPr>
-              <a:t>Text</a:t>
-            </a:r>
-          </a:p>
-        </p:txBody>
-      </p:sp>
-      <p:sp>
-        <p:nvSpPr>
-          <p:cNvPr id="35" name="TextBox 34"/>
+              <a:t>Deep reinforcement learning has been successfully applied to training Atari game agents. A lot of interests have been cast on designing new algorithms to improve performance. Here, we propose a new algorithm – double A3C and compare its performance with popular benchmarks.</a:t>
+            </a:r>
+          </a:p>
+        </p:txBody>
+      </p:sp>
+      <p:sp>
+        <p:nvSpPr>
+          <p:cNvPr id="38" name="TextBox 37"/>
           <p:cNvSpPr txBox="1"/>
           <p:nvPr/>
         </p:nvSpPr>
         <p:spPr>
           <a:xfrm>
-            <a:off x="18479394" y="4323635"/>
-            <a:ext cx="8536814" cy="477054"/>
+            <a:off x="20779630" y="10832391"/>
+            <a:ext cx="6288772" cy="8556188"/>
           </a:xfrm>
           <a:prstGeom prst="rect">
             <a:avLst/>
@@ -4623,14 +4148,14 @@
           </a:bodyPr>
           <a:lstStyle/>
           <a:p>
-            <a:pPr marL="571500" indent="-571500" algn="just" defTabSz="1306266" fontAlgn="base">
+            <a:pPr marL="342900" indent="-342900" defTabSz="1306266" fontAlgn="base">
               <a:spcBef>
                 <a:spcPct val="0"/>
               </a:spcBef>
               <a:spcAft>
                 <a:spcPct val="0"/>
               </a:spcAft>
-              <a:buFont typeface="Arial" charset="0"/>
+              <a:buFont typeface="Arial" panose="020B0604020202020204" pitchFamily="34" charset="0"/>
               <a:buChar char="•"/>
             </a:pPr>
             <a:r>
@@ -4642,45 +4167,22 @@
                 <a:ea typeface="Helvetica" charset="0"/>
                 <a:cs typeface="Helvetica" charset="0"/>
               </a:rPr>
-              <a:t>text</a:t>
-            </a:r>
-          </a:p>
-        </p:txBody>
-      </p:sp>
-      <p:sp>
-        <p:nvSpPr>
-          <p:cNvPr id="36" name="TextBox 35"/>
-          <p:cNvSpPr txBox="1"/>
-          <p:nvPr/>
-        </p:nvSpPr>
-        <p:spPr>
-          <a:xfrm>
-            <a:off x="9528439" y="8299573"/>
-            <a:ext cx="8597088" cy="477054"/>
-          </a:xfrm>
-          <a:prstGeom prst="rect">
-            <a:avLst/>
-          </a:prstGeom>
-          <a:noFill/>
-        </p:spPr>
-        <p:txBody>
-          <a:bodyPr wrap="square" rtlCol="0">
-            <a:spAutoFit/>
-          </a:bodyPr>
-          <a:lstStyle/>
-          <a:p>
-            <a:pPr marL="571500" indent="-571500" algn="just" defTabSz="1306266" fontAlgn="base">
+              <a:t>Double A3C outperforms DQN in most environment</a:t>
+            </a:r>
+          </a:p>
+          <a:p>
+            <a:pPr marL="342900" indent="-342900" defTabSz="1306266" fontAlgn="base">
               <a:spcBef>
                 <a:spcPct val="0"/>
               </a:spcBef>
               <a:spcAft>
                 <a:spcPct val="0"/>
               </a:spcAft>
-              <a:buFont typeface="Arial" charset="0"/>
+              <a:buFont typeface="Arial" panose="020B0604020202020204" pitchFamily="34" charset="0"/>
               <a:buChar char="•"/>
             </a:pPr>
             <a:r>
-              <a:rPr lang="en-US" altLang="zh-TW" sz="2500" dirty="0">
+              <a:rPr lang="en-US" sz="2500" dirty="0">
                 <a:solidFill>
                   <a:srgbClr val="000000"/>
                 </a:solidFill>
@@ -4688,41 +4190,18 @@
                 <a:ea typeface="Helvetica" charset="0"/>
                 <a:cs typeface="Helvetica" charset="0"/>
               </a:rPr>
-              <a:t>text</a:t>
-            </a:r>
-          </a:p>
-        </p:txBody>
-      </p:sp>
-      <p:sp>
-        <p:nvSpPr>
-          <p:cNvPr id="38" name="TextBox 37"/>
-          <p:cNvSpPr txBox="1"/>
-          <p:nvPr/>
-        </p:nvSpPr>
-        <p:spPr>
-          <a:xfrm>
-            <a:off x="18540095" y="12833002"/>
-            <a:ext cx="3936946" cy="477054"/>
-          </a:xfrm>
-          <a:prstGeom prst="rect">
-            <a:avLst/>
-          </a:prstGeom>
-          <a:noFill/>
-        </p:spPr>
-        <p:txBody>
-          <a:bodyPr wrap="square" rtlCol="0">
-            <a:spAutoFit/>
-          </a:bodyPr>
-          <a:lstStyle/>
-          <a:p>
-            <a:pPr marL="571500" indent="-571500" defTabSz="1306266" fontAlgn="base">
+              <a:t>Double A3C is more resistant to environment variation compared to DQN</a:t>
+            </a:r>
+          </a:p>
+          <a:p>
+            <a:pPr marL="342900" indent="-342900" defTabSz="1306266" fontAlgn="base">
               <a:spcBef>
                 <a:spcPct val="0"/>
               </a:spcBef>
               <a:spcAft>
                 <a:spcPct val="0"/>
               </a:spcAft>
-              <a:buFont typeface="Arial" charset="0"/>
+              <a:buFont typeface="Arial" panose="020B0604020202020204" pitchFamily="34" charset="0"/>
               <a:buChar char="•"/>
             </a:pPr>
             <a:r>
@@ -4734,8 +4213,156 @@
                 <a:ea typeface="Helvetica" charset="0"/>
                 <a:cs typeface="Helvetica" charset="0"/>
               </a:rPr>
-              <a:t>text</a:t>
-            </a:r>
+              <a:t>Performances of classical A3C and double A3C are at the same level</a:t>
+            </a:r>
+          </a:p>
+          <a:p>
+            <a:pPr marL="342900" indent="-342900" defTabSz="1306266" fontAlgn="base">
+              <a:spcBef>
+                <a:spcPct val="0"/>
+              </a:spcBef>
+              <a:spcAft>
+                <a:spcPct val="0"/>
+              </a:spcAft>
+              <a:buFont typeface="Arial" panose="020B0604020202020204" pitchFamily="34" charset="0"/>
+              <a:buChar char="•"/>
+            </a:pPr>
+            <a:r>
+              <a:rPr lang="en-US" sz="2500" dirty="0">
+                <a:solidFill>
+                  <a:srgbClr val="000000"/>
+                </a:solidFill>
+                <a:latin typeface="Helvetica" charset="0"/>
+                <a:ea typeface="Helvetica" charset="0"/>
+                <a:cs typeface="Helvetica" charset="0"/>
+              </a:rPr>
+              <a:t>We hope to use double A3C to break the correlations between states for achieving better performance. However, A3C already used multiple parallel agents during update. Such parallel agents have already removed correlation in certain degree. Therefore, adding a second value function does not significantly improve the performance.</a:t>
+            </a:r>
+          </a:p>
+          <a:p>
+            <a:pPr marL="342900" indent="-342900" defTabSz="1306266" fontAlgn="base">
+              <a:spcBef>
+                <a:spcPct val="0"/>
+              </a:spcBef>
+              <a:spcAft>
+                <a:spcPct val="0"/>
+              </a:spcAft>
+              <a:buFont typeface="Arial" panose="020B0604020202020204" pitchFamily="34" charset="0"/>
+              <a:buChar char="•"/>
+            </a:pPr>
+            <a:r>
+              <a:rPr lang="en-US" sz="2500" dirty="0">
+                <a:solidFill>
+                  <a:srgbClr val="000000"/>
+                </a:solidFill>
+                <a:latin typeface="Helvetica" charset="0"/>
+                <a:ea typeface="Helvetica" charset="0"/>
+                <a:cs typeface="Helvetica" charset="0"/>
+              </a:rPr>
+              <a:t>Double A3C is inspired by double DQN to remove bias. However, classical A3C does not introduce maximization bias.</a:t>
+            </a:r>
+          </a:p>
+          <a:p>
+            <a:pPr marL="342900" indent="-342900" defTabSz="1306266" fontAlgn="base">
+              <a:spcBef>
+                <a:spcPct val="0"/>
+              </a:spcBef>
+              <a:spcAft>
+                <a:spcPct val="0"/>
+              </a:spcAft>
+              <a:buFont typeface="Arial" panose="020B0604020202020204" pitchFamily="34" charset="0"/>
+              <a:buChar char="•"/>
+            </a:pPr>
+            <a:r>
+              <a:rPr lang="en-US" sz="2500" dirty="0">
+                <a:solidFill>
+                  <a:srgbClr val="000000"/>
+                </a:solidFill>
+                <a:latin typeface="Helvetica" charset="0"/>
+                <a:ea typeface="Helvetica" charset="0"/>
+                <a:cs typeface="Helvetica" charset="0"/>
+              </a:rPr>
+              <a:t>Implement V-trace to </a:t>
+            </a:r>
+            <a:r>
+              <a:rPr lang="en-US" sz="2500">
+                <a:solidFill>
+                  <a:srgbClr val="000000"/>
+                </a:solidFill>
+                <a:latin typeface="Helvetica" charset="0"/>
+                <a:ea typeface="Helvetica" charset="0"/>
+                <a:cs typeface="Helvetica" charset="0"/>
+              </a:rPr>
+              <a:t>reduce policy lag</a:t>
+            </a:r>
+            <a:endParaRPr lang="en-US" sz="2500" dirty="0">
+              <a:solidFill>
+                <a:srgbClr val="000000"/>
+              </a:solidFill>
+              <a:latin typeface="Helvetica" charset="0"/>
+              <a:ea typeface="Helvetica" charset="0"/>
+              <a:cs typeface="Helvetica" charset="0"/>
+            </a:endParaRPr>
+          </a:p>
+          <a:p>
+            <a:pPr marL="342900" indent="-342900" defTabSz="1306266" fontAlgn="base">
+              <a:spcBef>
+                <a:spcPct val="0"/>
+              </a:spcBef>
+              <a:spcAft>
+                <a:spcPct val="0"/>
+              </a:spcAft>
+              <a:buFont typeface="Arial" panose="020B0604020202020204" pitchFamily="34" charset="0"/>
+              <a:buChar char="•"/>
+            </a:pPr>
+            <a:endParaRPr lang="en-US" sz="2500" dirty="0">
+              <a:solidFill>
+                <a:srgbClr val="000000"/>
+              </a:solidFill>
+              <a:latin typeface="Helvetica" charset="0"/>
+              <a:ea typeface="Helvetica" charset="0"/>
+              <a:cs typeface="Helvetica" charset="0"/>
+            </a:endParaRPr>
+          </a:p>
+          <a:p>
+            <a:pPr marL="342900" indent="-342900" defTabSz="1306266" fontAlgn="base">
+              <a:spcBef>
+                <a:spcPct val="0"/>
+              </a:spcBef>
+              <a:spcAft>
+                <a:spcPct val="0"/>
+              </a:spcAft>
+              <a:buFont typeface="Arial" panose="020B0604020202020204" pitchFamily="34" charset="0"/>
+              <a:buChar char="•"/>
+            </a:pPr>
+            <a:endParaRPr lang="en-US" sz="2500" dirty="0">
+              <a:solidFill>
+                <a:srgbClr val="000000"/>
+              </a:solidFill>
+              <a:latin typeface="Helvetica" charset="0"/>
+              <a:ea typeface="Helvetica" charset="0"/>
+              <a:cs typeface="Helvetica" charset="0"/>
+            </a:endParaRPr>
+          </a:p>
+          <a:p>
+            <a:pPr marL="342900" indent="-342900" defTabSz="1306266" fontAlgn="base">
+              <a:spcBef>
+                <a:spcPct val="0"/>
+              </a:spcBef>
+              <a:spcAft>
+                <a:spcPct val="0"/>
+              </a:spcAft>
+              <a:buFont typeface="Arial" panose="020B0604020202020204" pitchFamily="34" charset="0"/>
+              <a:buChar char="•"/>
+            </a:pPr>
+            <a:endParaRPr lang="en-US" sz="2500" dirty="0">
+              <a:solidFill>
+                <a:srgbClr val="000000"/>
+              </a:solidFill>
+              <a:latin typeface="Helvetica" charset="0"/>
+              <a:ea typeface="Helvetica" charset="0"/>
+              <a:cs typeface="Helvetica" charset="0"/>
+            </a:endParaRPr>
           </a:p>
         </p:txBody>
       </p:sp>
@@ -4747,8 +4374,8 @@
         </p:nvSpPr>
         <p:spPr>
           <a:xfrm>
-            <a:off x="290437" y="6521021"/>
-            <a:ext cx="8791169" cy="8172376"/>
+            <a:off x="277685" y="6705633"/>
+            <a:ext cx="7785400" cy="8858915"/>
           </a:xfrm>
           <a:prstGeom prst="roundRect">
             <a:avLst>
@@ -4816,8 +4443,8 @@
         </p:nvSpPr>
         <p:spPr>
           <a:xfrm>
-            <a:off x="263689" y="14857498"/>
-            <a:ext cx="8803923" cy="3258831"/>
+            <a:off x="263689" y="15785168"/>
+            <a:ext cx="7818001" cy="2331161"/>
           </a:xfrm>
           <a:prstGeom prst="roundRect">
             <a:avLst>
@@ -4885,8 +4512,8 @@
         </p:nvSpPr>
         <p:spPr>
           <a:xfrm>
-            <a:off x="9356754" y="3442730"/>
-            <a:ext cx="8833498" cy="3816890"/>
+            <a:off x="8307917" y="3447462"/>
+            <a:ext cx="18795578" cy="6511386"/>
           </a:xfrm>
           <a:prstGeom prst="roundRect">
             <a:avLst>
@@ -4948,14 +4575,266 @@
       </p:sp>
       <p:sp>
         <p:nvSpPr>
-          <p:cNvPr id="24" name="Rounded Rectangle 23"/>
+          <p:cNvPr id="25" name="Subtitle 3"/>
+          <p:cNvSpPr txBox="1">
+            <a:spLocks/>
+          </p:cNvSpPr>
+          <p:nvPr/>
+        </p:nvSpPr>
+        <p:spPr>
+          <a:xfrm>
+            <a:off x="9356754" y="3530071"/>
+            <a:ext cx="17746740" cy="1010893"/>
+          </a:xfrm>
+          <a:prstGeom prst="rect">
+            <a:avLst/>
+          </a:prstGeom>
+        </p:spPr>
+        <p:txBody>
+          <a:bodyPr vert="horz" wrap="square" lIns="0" tIns="45720" rIns="0" bIns="45720" rtlCol="0">
+            <a:noAutofit/>
+          </a:bodyPr>
+          <a:lstStyle>
+            <a:lvl1pPr marL="0" indent="0" algn="ctr" defTabSz="1219215" rtl="0" eaLnBrk="1" fontAlgn="base" hangingPunct="1">
+              <a:spcBef>
+                <a:spcPct val="20000"/>
+              </a:spcBef>
+              <a:spcAft>
+                <a:spcPct val="0"/>
+              </a:spcAft>
+              <a:buClr>
+                <a:schemeClr val="bg2"/>
+              </a:buClr>
+              <a:buFont typeface="Wingdings" charset="2"/>
+              <a:buNone/>
+              <a:defRPr sz="5333" kern="1200" cap="small" spc="800">
+                <a:solidFill>
+                  <a:srgbClr val="A4001D"/>
+                </a:solidFill>
+                <a:latin typeface="Arial"/>
+                <a:ea typeface="ＭＳ Ｐゴシック" charset="0"/>
+                <a:cs typeface="ＭＳ Ｐゴシック" charset="0"/>
+              </a:defRPr>
+            </a:lvl1pPr>
+            <a:lvl2pPr marL="1219215" indent="0" algn="ctr" defTabSz="1219215" rtl="0" eaLnBrk="1" fontAlgn="base" hangingPunct="1">
+              <a:spcBef>
+                <a:spcPct val="20000"/>
+              </a:spcBef>
+              <a:spcAft>
+                <a:spcPct val="0"/>
+              </a:spcAft>
+              <a:buClr>
+                <a:schemeClr val="bg2"/>
+              </a:buClr>
+              <a:buFont typeface="Wingdings" charset="2"/>
+              <a:buNone/>
+              <a:defRPr kern="1200">
+                <a:solidFill>
+                  <a:schemeClr val="tx1">
+                    <a:tint val="75000"/>
+                  </a:schemeClr>
+                </a:solidFill>
+                <a:latin typeface="Arial"/>
+                <a:ea typeface="ＭＳ Ｐゴシック" charset="0"/>
+                <a:cs typeface="+mn-cs"/>
+              </a:defRPr>
+            </a:lvl2pPr>
+            <a:lvl3pPr marL="2438430" indent="0" algn="ctr" defTabSz="1219215" rtl="0" eaLnBrk="1" fontAlgn="base" hangingPunct="1">
+              <a:spcBef>
+                <a:spcPct val="20000"/>
+              </a:spcBef>
+              <a:spcAft>
+                <a:spcPct val="0"/>
+              </a:spcAft>
+              <a:buClr>
+                <a:schemeClr val="bg2"/>
+              </a:buClr>
+              <a:buSzPct val="102000"/>
+              <a:buFont typeface="Source Sans Pro" charset="0"/>
+              <a:buNone/>
+              <a:defRPr kern="1200">
+                <a:solidFill>
+                  <a:schemeClr val="tx1">
+                    <a:tint val="75000"/>
+                  </a:schemeClr>
+                </a:solidFill>
+                <a:latin typeface="Arial"/>
+                <a:ea typeface="ＭＳ Ｐゴシック" charset="0"/>
+                <a:cs typeface="+mn-cs"/>
+              </a:defRPr>
+            </a:lvl3pPr>
+            <a:lvl4pPr marL="3657646" indent="0" algn="ctr" defTabSz="1219215" rtl="0" eaLnBrk="1" fontAlgn="base" hangingPunct="1">
+              <a:spcBef>
+                <a:spcPct val="20000"/>
+              </a:spcBef>
+              <a:spcAft>
+                <a:spcPct val="0"/>
+              </a:spcAft>
+              <a:buClr>
+                <a:schemeClr val="bg2"/>
+              </a:buClr>
+              <a:buFont typeface="Arial" charset="0"/>
+              <a:buNone/>
+              <a:defRPr kern="1200">
+                <a:solidFill>
+                  <a:schemeClr val="tx1">
+                    <a:tint val="75000"/>
+                  </a:schemeClr>
+                </a:solidFill>
+                <a:latin typeface="Arial"/>
+                <a:ea typeface="ＭＳ Ｐゴシック" charset="0"/>
+                <a:cs typeface="+mn-cs"/>
+              </a:defRPr>
+            </a:lvl4pPr>
+            <a:lvl5pPr marL="4876861" indent="0" algn="ctr" defTabSz="1219215" rtl="0" eaLnBrk="1" fontAlgn="base" hangingPunct="1">
+              <a:spcBef>
+                <a:spcPct val="20000"/>
+              </a:spcBef>
+              <a:spcAft>
+                <a:spcPct val="0"/>
+              </a:spcAft>
+              <a:buClr>
+                <a:schemeClr val="bg2"/>
+              </a:buClr>
+              <a:buFont typeface="Source Sans Pro" charset="0"/>
+              <a:buNone/>
+              <a:defRPr kern="1200">
+                <a:solidFill>
+                  <a:schemeClr val="tx1">
+                    <a:tint val="75000"/>
+                  </a:schemeClr>
+                </a:solidFill>
+                <a:latin typeface="Arial"/>
+                <a:ea typeface="ＭＳ Ｐゴシック" charset="0"/>
+                <a:cs typeface="+mn-cs"/>
+              </a:defRPr>
+            </a:lvl5pPr>
+            <a:lvl6pPr marL="6096076" indent="0" algn="ctr" defTabSz="1219215" rtl="0" eaLnBrk="1" latinLnBrk="0" hangingPunct="1">
+              <a:spcBef>
+                <a:spcPct val="20000"/>
+              </a:spcBef>
+              <a:buFont typeface="Arial"/>
+              <a:buNone/>
+              <a:defRPr sz="5333" kern="1200">
+                <a:solidFill>
+                  <a:schemeClr val="tx1">
+                    <a:tint val="75000"/>
+                  </a:schemeClr>
+                </a:solidFill>
+                <a:latin typeface="+mn-lt"/>
+                <a:ea typeface="+mn-ea"/>
+                <a:cs typeface="+mn-cs"/>
+              </a:defRPr>
+            </a:lvl6pPr>
+            <a:lvl7pPr marL="7315291" indent="0" algn="ctr" defTabSz="1219215" rtl="0" eaLnBrk="1" latinLnBrk="0" hangingPunct="1">
+              <a:spcBef>
+                <a:spcPct val="20000"/>
+              </a:spcBef>
+              <a:buFont typeface="Arial"/>
+              <a:buNone/>
+              <a:defRPr sz="5333" kern="1200">
+                <a:solidFill>
+                  <a:schemeClr val="tx1">
+                    <a:tint val="75000"/>
+                  </a:schemeClr>
+                </a:solidFill>
+                <a:latin typeface="+mn-lt"/>
+                <a:ea typeface="+mn-ea"/>
+                <a:cs typeface="+mn-cs"/>
+              </a:defRPr>
+            </a:lvl7pPr>
+            <a:lvl8pPr marL="8534507" indent="0" algn="ctr" defTabSz="1219215" rtl="0" eaLnBrk="1" latinLnBrk="0" hangingPunct="1">
+              <a:spcBef>
+                <a:spcPct val="20000"/>
+              </a:spcBef>
+              <a:buFont typeface="Arial"/>
+              <a:buNone/>
+              <a:defRPr sz="5333" kern="1200">
+                <a:solidFill>
+                  <a:schemeClr val="tx1">
+                    <a:tint val="75000"/>
+                  </a:schemeClr>
+                </a:solidFill>
+                <a:latin typeface="+mn-lt"/>
+                <a:ea typeface="+mn-ea"/>
+                <a:cs typeface="+mn-cs"/>
+              </a:defRPr>
+            </a:lvl8pPr>
+            <a:lvl9pPr marL="9753722" indent="0" algn="ctr" defTabSz="1219215" rtl="0" eaLnBrk="1" latinLnBrk="0" hangingPunct="1">
+              <a:spcBef>
+                <a:spcPct val="20000"/>
+              </a:spcBef>
+              <a:buFont typeface="Arial"/>
+              <a:buNone/>
+              <a:defRPr sz="5333" kern="1200">
+                <a:solidFill>
+                  <a:schemeClr val="tx1">
+                    <a:tint val="75000"/>
+                  </a:schemeClr>
+                </a:solidFill>
+                <a:latin typeface="+mn-lt"/>
+                <a:ea typeface="+mn-ea"/>
+                <a:cs typeface="+mn-cs"/>
+              </a:defRPr>
+            </a:lvl9pPr>
+          </a:lstStyle>
+          <a:p>
+            <a:pPr fontAlgn="auto">
+              <a:spcBef>
+                <a:spcPts val="600"/>
+              </a:spcBef>
+              <a:spcAft>
+                <a:spcPts val="0"/>
+              </a:spcAft>
+              <a:buClr>
+                <a:srgbClr val="8C1515"/>
+              </a:buClr>
+              <a:defRPr/>
+            </a:pPr>
+            <a:r>
+              <a:rPr lang="en-US" sz="4500" spc="300" dirty="0">
+                <a:solidFill>
+                  <a:srgbClr val="8C1515"/>
+                </a:solidFill>
+                <a:ea typeface=""/>
+                <a:cs typeface=""/>
+              </a:rPr>
+              <a:t>A3C Network Structure</a:t>
+            </a:r>
+          </a:p>
+          <a:p>
+            <a:pPr fontAlgn="auto">
+              <a:spcBef>
+                <a:spcPts val="600"/>
+              </a:spcBef>
+              <a:spcAft>
+                <a:spcPts val="0"/>
+              </a:spcAft>
+              <a:buClr>
+                <a:srgbClr val="8C1515"/>
+              </a:buClr>
+              <a:defRPr/>
+            </a:pPr>
+            <a:endParaRPr lang="en-US" spc="300" dirty="0">
+              <a:solidFill>
+                <a:srgbClr val="8C1515"/>
+              </a:solidFill>
+              <a:ea typeface=""/>
+              <a:cs typeface=""/>
+            </a:endParaRPr>
+          </a:p>
+        </p:txBody>
+      </p:sp>
+      <p:sp>
+        <p:nvSpPr>
+          <p:cNvPr id="44" name="Rounded Rectangle 43"/>
           <p:cNvSpPr/>
           <p:nvPr/>
         </p:nvSpPr>
         <p:spPr>
           <a:xfrm>
-            <a:off x="18407337" y="3447462"/>
-            <a:ext cx="8710785" cy="8111350"/>
+            <a:off x="8341946" y="10152571"/>
+            <a:ext cx="12235224" cy="7963760"/>
           </a:xfrm>
           <a:prstGeom prst="roundRect">
             <a:avLst>
@@ -5017,266 +4896,14 @@
       </p:sp>
       <p:sp>
         <p:nvSpPr>
-          <p:cNvPr id="25" name="Subtitle 3"/>
-          <p:cNvSpPr txBox="1">
-            <a:spLocks/>
-          </p:cNvSpPr>
+          <p:cNvPr id="45" name="Rounded Rectangle 44"/>
+          <p:cNvSpPr/>
           <p:nvPr/>
         </p:nvSpPr>
         <p:spPr>
           <a:xfrm>
-            <a:off x="9356754" y="3530071"/>
-            <a:ext cx="8704048" cy="1010893"/>
-          </a:xfrm>
-          <a:prstGeom prst="rect">
-            <a:avLst/>
-          </a:prstGeom>
-        </p:spPr>
-        <p:txBody>
-          <a:bodyPr vert="horz" wrap="square" lIns="0" tIns="45720" rIns="0" bIns="45720" rtlCol="0">
-            <a:noAutofit/>
-          </a:bodyPr>
-          <a:lstStyle>
-            <a:lvl1pPr marL="0" indent="0" algn="ctr" defTabSz="1219215" rtl="0" eaLnBrk="1" fontAlgn="base" hangingPunct="1">
-              <a:spcBef>
-                <a:spcPct val="20000"/>
-              </a:spcBef>
-              <a:spcAft>
-                <a:spcPct val="0"/>
-              </a:spcAft>
-              <a:buClr>
-                <a:schemeClr val="bg2"/>
-              </a:buClr>
-              <a:buFont typeface="Wingdings" charset="2"/>
-              <a:buNone/>
-              <a:defRPr sz="5333" kern="1200" cap="small" spc="800">
-                <a:solidFill>
-                  <a:srgbClr val="A4001D"/>
-                </a:solidFill>
-                <a:latin typeface="Arial"/>
-                <a:ea typeface="ＭＳ Ｐゴシック" charset="0"/>
-                <a:cs typeface="ＭＳ Ｐゴシック" charset="0"/>
-              </a:defRPr>
-            </a:lvl1pPr>
-            <a:lvl2pPr marL="1219215" indent="0" algn="ctr" defTabSz="1219215" rtl="0" eaLnBrk="1" fontAlgn="base" hangingPunct="1">
-              <a:spcBef>
-                <a:spcPct val="20000"/>
-              </a:spcBef>
-              <a:spcAft>
-                <a:spcPct val="0"/>
-              </a:spcAft>
-              <a:buClr>
-                <a:schemeClr val="bg2"/>
-              </a:buClr>
-              <a:buFont typeface="Wingdings" charset="2"/>
-              <a:buNone/>
-              <a:defRPr kern="1200">
-                <a:solidFill>
-                  <a:schemeClr val="tx1">
-                    <a:tint val="75000"/>
-                  </a:schemeClr>
-                </a:solidFill>
-                <a:latin typeface="Arial"/>
-                <a:ea typeface="ＭＳ Ｐゴシック" charset="0"/>
-                <a:cs typeface="+mn-cs"/>
-              </a:defRPr>
-            </a:lvl2pPr>
-            <a:lvl3pPr marL="2438430" indent="0" algn="ctr" defTabSz="1219215" rtl="0" eaLnBrk="1" fontAlgn="base" hangingPunct="1">
-              <a:spcBef>
-                <a:spcPct val="20000"/>
-              </a:spcBef>
-              <a:spcAft>
-                <a:spcPct val="0"/>
-              </a:spcAft>
-              <a:buClr>
-                <a:schemeClr val="bg2"/>
-              </a:buClr>
-              <a:buSzPct val="102000"/>
-              <a:buFont typeface="Source Sans Pro" charset="0"/>
-              <a:buNone/>
-              <a:defRPr kern="1200">
-                <a:solidFill>
-                  <a:schemeClr val="tx1">
-                    <a:tint val="75000"/>
-                  </a:schemeClr>
-                </a:solidFill>
-                <a:latin typeface="Arial"/>
-                <a:ea typeface="ＭＳ Ｐゴシック" charset="0"/>
-                <a:cs typeface="+mn-cs"/>
-              </a:defRPr>
-            </a:lvl3pPr>
-            <a:lvl4pPr marL="3657646" indent="0" algn="ctr" defTabSz="1219215" rtl="0" eaLnBrk="1" fontAlgn="base" hangingPunct="1">
-              <a:spcBef>
-                <a:spcPct val="20000"/>
-              </a:spcBef>
-              <a:spcAft>
-                <a:spcPct val="0"/>
-              </a:spcAft>
-              <a:buClr>
-                <a:schemeClr val="bg2"/>
-              </a:buClr>
-              <a:buFont typeface="Arial" charset="0"/>
-              <a:buNone/>
-              <a:defRPr kern="1200">
-                <a:solidFill>
-                  <a:schemeClr val="tx1">
-                    <a:tint val="75000"/>
-                  </a:schemeClr>
-                </a:solidFill>
-                <a:latin typeface="Arial"/>
-                <a:ea typeface="ＭＳ Ｐゴシック" charset="0"/>
-                <a:cs typeface="+mn-cs"/>
-              </a:defRPr>
-            </a:lvl4pPr>
-            <a:lvl5pPr marL="4876861" indent="0" algn="ctr" defTabSz="1219215" rtl="0" eaLnBrk="1" fontAlgn="base" hangingPunct="1">
-              <a:spcBef>
-                <a:spcPct val="20000"/>
-              </a:spcBef>
-              <a:spcAft>
-                <a:spcPct val="0"/>
-              </a:spcAft>
-              <a:buClr>
-                <a:schemeClr val="bg2"/>
-              </a:buClr>
-              <a:buFont typeface="Source Sans Pro" charset="0"/>
-              <a:buNone/>
-              <a:defRPr kern="1200">
-                <a:solidFill>
-                  <a:schemeClr val="tx1">
-                    <a:tint val="75000"/>
-                  </a:schemeClr>
-                </a:solidFill>
-                <a:latin typeface="Arial"/>
-                <a:ea typeface="ＭＳ Ｐゴシック" charset="0"/>
-                <a:cs typeface="+mn-cs"/>
-              </a:defRPr>
-            </a:lvl5pPr>
-            <a:lvl6pPr marL="6096076" indent="0" algn="ctr" defTabSz="1219215" rtl="0" eaLnBrk="1" latinLnBrk="0" hangingPunct="1">
-              <a:spcBef>
-                <a:spcPct val="20000"/>
-              </a:spcBef>
-              <a:buFont typeface="Arial"/>
-              <a:buNone/>
-              <a:defRPr sz="5333" kern="1200">
-                <a:solidFill>
-                  <a:schemeClr val="tx1">
-                    <a:tint val="75000"/>
-                  </a:schemeClr>
-                </a:solidFill>
-                <a:latin typeface="+mn-lt"/>
-                <a:ea typeface="+mn-ea"/>
-                <a:cs typeface="+mn-cs"/>
-              </a:defRPr>
-            </a:lvl6pPr>
-            <a:lvl7pPr marL="7315291" indent="0" algn="ctr" defTabSz="1219215" rtl="0" eaLnBrk="1" latinLnBrk="0" hangingPunct="1">
-              <a:spcBef>
-                <a:spcPct val="20000"/>
-              </a:spcBef>
-              <a:buFont typeface="Arial"/>
-              <a:buNone/>
-              <a:defRPr sz="5333" kern="1200">
-                <a:solidFill>
-                  <a:schemeClr val="tx1">
-                    <a:tint val="75000"/>
-                  </a:schemeClr>
-                </a:solidFill>
-                <a:latin typeface="+mn-lt"/>
-                <a:ea typeface="+mn-ea"/>
-                <a:cs typeface="+mn-cs"/>
-              </a:defRPr>
-            </a:lvl7pPr>
-            <a:lvl8pPr marL="8534507" indent="0" algn="ctr" defTabSz="1219215" rtl="0" eaLnBrk="1" latinLnBrk="0" hangingPunct="1">
-              <a:spcBef>
-                <a:spcPct val="20000"/>
-              </a:spcBef>
-              <a:buFont typeface="Arial"/>
-              <a:buNone/>
-              <a:defRPr sz="5333" kern="1200">
-                <a:solidFill>
-                  <a:schemeClr val="tx1">
-                    <a:tint val="75000"/>
-                  </a:schemeClr>
-                </a:solidFill>
-                <a:latin typeface="+mn-lt"/>
-                <a:ea typeface="+mn-ea"/>
-                <a:cs typeface="+mn-cs"/>
-              </a:defRPr>
-            </a:lvl8pPr>
-            <a:lvl9pPr marL="9753722" indent="0" algn="ctr" defTabSz="1219215" rtl="0" eaLnBrk="1" latinLnBrk="0" hangingPunct="1">
-              <a:spcBef>
-                <a:spcPct val="20000"/>
-              </a:spcBef>
-              <a:buFont typeface="Arial"/>
-              <a:buNone/>
-              <a:defRPr sz="5333" kern="1200">
-                <a:solidFill>
-                  <a:schemeClr val="tx1">
-                    <a:tint val="75000"/>
-                  </a:schemeClr>
-                </a:solidFill>
-                <a:latin typeface="+mn-lt"/>
-                <a:ea typeface="+mn-ea"/>
-                <a:cs typeface="+mn-cs"/>
-              </a:defRPr>
-            </a:lvl9pPr>
-          </a:lstStyle>
-          <a:p>
-            <a:pPr fontAlgn="auto">
-              <a:spcBef>
-                <a:spcPts val="600"/>
-              </a:spcBef>
-              <a:spcAft>
-                <a:spcPts val="0"/>
-              </a:spcAft>
-              <a:buClr>
-                <a:srgbClr val="8C1515"/>
-              </a:buClr>
-              <a:defRPr/>
-            </a:pPr>
-            <a:r>
-              <a:rPr lang="en-US" sz="4500" spc="300" dirty="0">
-                <a:solidFill>
-                  <a:srgbClr val="8C1515"/>
-                </a:solidFill>
-                <a:ea typeface=""/>
-                <a:cs typeface=""/>
-              </a:rPr>
-              <a:t>Text</a:t>
-            </a:r>
-          </a:p>
-          <a:p>
-            <a:pPr fontAlgn="auto">
-              <a:spcBef>
-                <a:spcPts val="600"/>
-              </a:spcBef>
-              <a:spcAft>
-                <a:spcPts val="0"/>
-              </a:spcAft>
-              <a:buClr>
-                <a:srgbClr val="8C1515"/>
-              </a:buClr>
-              <a:defRPr/>
-            </a:pPr>
-            <a:endParaRPr lang="en-US" spc="300" dirty="0">
-              <a:solidFill>
-                <a:srgbClr val="8C1515"/>
-              </a:solidFill>
-              <a:ea typeface=""/>
-              <a:cs typeface=""/>
-            </a:endParaRPr>
-          </a:p>
-        </p:txBody>
-      </p:sp>
-      <p:sp>
-        <p:nvSpPr>
-          <p:cNvPr id="44" name="Rounded Rectangle 43"/>
-          <p:cNvSpPr/>
-          <p:nvPr/>
-        </p:nvSpPr>
-        <p:spPr>
-          <a:xfrm>
-            <a:off x="9356754" y="7427217"/>
-            <a:ext cx="8833498" cy="10689114"/>
+            <a:off x="20779630" y="10152571"/>
+            <a:ext cx="6323866" cy="7963759"/>
           </a:xfrm>
           <a:prstGeom prst="roundRect">
             <a:avLst>
@@ -5338,83 +4965,14 @@
       </p:sp>
       <p:sp>
         <p:nvSpPr>
-          <p:cNvPr id="45" name="Rounded Rectangle 44"/>
-          <p:cNvSpPr/>
-          <p:nvPr/>
-        </p:nvSpPr>
-        <p:spPr>
-          <a:xfrm>
-            <a:off x="18407338" y="11730418"/>
-            <a:ext cx="8696158" cy="6385912"/>
-          </a:xfrm>
-          <a:prstGeom prst="roundRect">
-            <a:avLst>
-              <a:gd name="adj" fmla="val 0"/>
-            </a:avLst>
-          </a:prstGeom>
-          <a:noFill/>
-          <a:ln w="9525" cap="flat" cmpd="sng" algn="ctr">
-            <a:solidFill>
-              <a:srgbClr val="8D3C1E"/>
-            </a:solidFill>
-            <a:prstDash val="solid"/>
-          </a:ln>
-          <a:effectLst>
-            <a:outerShdw blurRad="38100" dist="25400" dir="2700000" algn="br" rotWithShape="0">
-              <a:srgbClr val="000000">
-                <a:alpha val="60000"/>
-              </a:srgbClr>
-            </a:outerShdw>
-          </a:effectLst>
-        </p:spPr>
-        <p:txBody>
-          <a:bodyPr rtlCol="0" anchor="ctr"/>
-          <a:lstStyle/>
-          <a:p>
-            <a:pPr marL="0" marR="0" lvl="0" indent="0" algn="ctr" defTabSz="1306266" eaLnBrk="1" fontAlgn="base" latinLnBrk="0" hangingPunct="1">
-              <a:lnSpc>
-                <a:spcPct val="100000"/>
-              </a:lnSpc>
-              <a:spcBef>
-                <a:spcPct val="0"/>
-              </a:spcBef>
-              <a:spcAft>
-                <a:spcPct val="0"/>
-              </a:spcAft>
-              <a:buClrTx/>
-              <a:buSzTx/>
-              <a:buFontTx/>
-              <a:buNone/>
-              <a:tabLst/>
-              <a:defRPr/>
-            </a:pPr>
-            <a:endParaRPr kumimoji="0" lang="en-US" sz="6857" b="0" i="0" u="none" strike="noStrike" kern="0" cap="none" spc="0" normalizeH="0" baseline="0" noProof="0">
-              <a:ln>
-                <a:noFill/>
-              </a:ln>
-              <a:solidFill>
-                <a:srgbClr val="FFFFFF"/>
-              </a:solidFill>
-              <a:effectLst/>
-              <a:uLnTx/>
-              <a:uFillTx/>
-              <a:latin typeface="Source Sans Pro"/>
-              <a:ea typeface=""/>
-              <a:cs typeface=""/>
-            </a:endParaRPr>
-          </a:p>
-        </p:txBody>
-      </p:sp>
-      <p:sp>
-        <p:nvSpPr>
           <p:cNvPr id="52" name="TextBox 51"/>
           <p:cNvSpPr txBox="1"/>
           <p:nvPr/>
         </p:nvSpPr>
         <p:spPr>
           <a:xfrm>
-            <a:off x="522516" y="7380849"/>
-            <a:ext cx="8356631" cy="477054"/>
+            <a:off x="363598" y="7380849"/>
+            <a:ext cx="7699487" cy="5863144"/>
           </a:xfrm>
           <a:prstGeom prst="rect">
             <a:avLst/>
@@ -5427,15 +4985,13 @@
           </a:bodyPr>
           <a:lstStyle/>
           <a:p>
-            <a:pPr marL="571500" indent="-571500" algn="just" defTabSz="1306266" fontAlgn="base">
+            <a:pPr algn="just" defTabSz="1306266" fontAlgn="base">
               <a:spcBef>
                 <a:spcPct val="0"/>
               </a:spcBef>
               <a:spcAft>
                 <a:spcPct val="0"/>
               </a:spcAft>
-              <a:buFont typeface="Arial" charset="0"/>
-              <a:buChar char="•"/>
             </a:pPr>
             <a:r>
               <a:rPr lang="en-US" altLang="zh-TW" sz="2500" dirty="0">
@@ -5446,7 +5002,7 @@
                 <a:ea typeface="Helvetica" charset="0"/>
                 <a:cs typeface="Helvetica" charset="0"/>
               </a:rPr>
-              <a:t>Text</a:t>
+              <a:t>Reinforcement learning is an area regarding how agents act to an unknown environment for maximizing its rewards. Unlike Markov Decision Process in which agent has full knowledge of its state, rewards, and transitional probability, RL agent utilizes exploration and exploitation to cover model uncertainty. Because the model usually has a large input feature space, a neural network (NN) is often used to summarize the correlation between input feature and output state action value. Our goal is to improve state-of-the-art A3C (Asynchronous Advantage Actor-Critic) algorithm by implementing our own “double A3C”. We compare its performance with Deep Q-network (DQN) and vanilla A3C on three Atari games: Pong, Ice Hockey and Breakout.</a:t>
             </a:r>
           </a:p>
         </p:txBody>
@@ -5518,8 +5074,8 @@
         </p:nvSpPr>
         <p:spPr>
           <a:xfrm>
-            <a:off x="9528439" y="4348473"/>
-            <a:ext cx="8564112" cy="1015663"/>
+            <a:off x="22311896" y="4211069"/>
+            <a:ext cx="4892829" cy="6247864"/>
           </a:xfrm>
           <a:prstGeom prst="rect">
             <a:avLst/>
@@ -5532,14 +5088,14 @@
           </a:bodyPr>
           <a:lstStyle/>
           <a:p>
-            <a:pPr marL="571500" indent="-571500" algn="just" defTabSz="1306266" fontAlgn="base">
+            <a:pPr marL="342900" indent="-342900" defTabSz="1306266" fontAlgn="base">
               <a:spcBef>
                 <a:spcPct val="0"/>
               </a:spcBef>
               <a:spcAft>
                 <a:spcPct val="0"/>
               </a:spcAft>
-              <a:buFont typeface="Arial" charset="0"/>
+              <a:buFont typeface="Arial" panose="020B0604020202020204" pitchFamily="34" charset="0"/>
               <a:buChar char="•"/>
             </a:pPr>
             <a:r>
@@ -5551,18 +5107,100 @@
                 <a:ea typeface="Helvetica" charset="0"/>
                 <a:cs typeface="Helvetica" charset="0"/>
               </a:rPr>
-              <a:t>Text</a:t>
-            </a:r>
-          </a:p>
-          <a:p>
-            <a:pPr algn="just" defTabSz="1306266" fontAlgn="base">
+              <a:t>Improved classical A3C network structure by introducing double A3C</a:t>
+            </a:r>
+          </a:p>
+          <a:p>
+            <a:pPr marL="342900" indent="-342900" defTabSz="1306266" fontAlgn="base">
               <a:spcBef>
                 <a:spcPct val="0"/>
               </a:spcBef>
               <a:spcAft>
                 <a:spcPct val="0"/>
               </a:spcAft>
+              <a:buFont typeface="Arial" panose="020B0604020202020204" pitchFamily="34" charset="0"/>
+              <a:buChar char="•"/>
             </a:pPr>
+            <a:r>
+              <a:rPr lang="en-US" sz="2500" dirty="0">
+                <a:solidFill>
+                  <a:srgbClr val="000000"/>
+                </a:solidFill>
+                <a:latin typeface="Helvetica" charset="0"/>
+                <a:ea typeface="Helvetica" charset="0"/>
+                <a:cs typeface="Helvetica" charset="0"/>
+              </a:rPr>
+              <a:t>Double A3C maintains two independent value functions </a:t>
+            </a:r>
+          </a:p>
+          <a:p>
+            <a:pPr marL="342900" indent="-342900" defTabSz="1306266" fontAlgn="base">
+              <a:spcBef>
+                <a:spcPct val="0"/>
+              </a:spcBef>
+              <a:spcAft>
+                <a:spcPct val="0"/>
+              </a:spcAft>
+              <a:buFont typeface="Arial" panose="020B0604020202020204" pitchFamily="34" charset="0"/>
+              <a:buChar char="•"/>
+            </a:pPr>
+            <a:r>
+              <a:rPr lang="en-US" sz="2500" dirty="0">
+                <a:solidFill>
+                  <a:srgbClr val="000000"/>
+                </a:solidFill>
+                <a:latin typeface="Helvetica" charset="0"/>
+                <a:ea typeface="Helvetica" charset="0"/>
+                <a:cs typeface="Helvetica" charset="0"/>
+              </a:rPr>
+              <a:t>Double A3C concatenates the fully connected layers before value function output layers to generate one policy</a:t>
+            </a:r>
+          </a:p>
+          <a:p>
+            <a:pPr marL="342900" indent="-342900" defTabSz="1306266" fontAlgn="base">
+              <a:spcBef>
+                <a:spcPct val="0"/>
+              </a:spcBef>
+              <a:spcAft>
+                <a:spcPct val="0"/>
+              </a:spcAft>
+              <a:buFont typeface="Arial" panose="020B0604020202020204" pitchFamily="34" charset="0"/>
+              <a:buChar char="•"/>
+            </a:pPr>
+            <a:r>
+              <a:rPr lang="en-US" sz="2500" dirty="0">
+                <a:solidFill>
+                  <a:srgbClr val="000000"/>
+                </a:solidFill>
+                <a:latin typeface="Helvetica" charset="0"/>
+                <a:ea typeface="Helvetica" charset="0"/>
+                <a:cs typeface="Helvetica" charset="0"/>
+              </a:rPr>
+              <a:t>Randomly pick one value function to update during training</a:t>
+            </a:r>
+          </a:p>
+          <a:p>
+            <a:pPr marL="342900" indent="-342900" defTabSz="1306266" fontAlgn="base">
+              <a:spcBef>
+                <a:spcPct val="0"/>
+              </a:spcBef>
+              <a:spcAft>
+                <a:spcPct val="0"/>
+              </a:spcAft>
+              <a:buFont typeface="Arial" panose="020B0604020202020204" pitchFamily="34" charset="0"/>
+              <a:buChar char="•"/>
+            </a:pPr>
+            <a:r>
+              <a:rPr lang="en-US" sz="2500" dirty="0">
+                <a:solidFill>
+                  <a:srgbClr val="000000"/>
+                </a:solidFill>
+                <a:latin typeface="Helvetica" charset="0"/>
+                <a:ea typeface="Helvetica" charset="0"/>
+                <a:cs typeface="Helvetica" charset="0"/>
+              </a:rPr>
+              <a:t>Varied shared number of layers between two value functions </a:t>
+            </a:r>
             <a:endParaRPr lang="en-US" sz="1000" dirty="0">
               <a:solidFill>
                 <a:srgbClr val="000000"/>
@@ -5573,7 +5211,7 @@
             </a:endParaRPr>
           </a:p>
           <a:p>
-            <a:pPr algn="just" defTabSz="1306266" fontAlgn="base">
+            <a:pPr defTabSz="1306266" fontAlgn="base">
               <a:spcBef>
                 <a:spcPct val="0"/>
               </a:spcBef>
@@ -5600,8 +5238,8 @@
         </p:nvSpPr>
         <p:spPr>
           <a:xfrm>
-            <a:off x="522515" y="15768511"/>
-            <a:ext cx="8346060" cy="477054"/>
+            <a:off x="363598" y="16514626"/>
+            <a:ext cx="7699487" cy="1246495"/>
           </a:xfrm>
           <a:prstGeom prst="rect">
             <a:avLst/>
@@ -5614,14 +5252,14 @@
           </a:bodyPr>
           <a:lstStyle/>
           <a:p>
-            <a:pPr marL="571500" indent="-571500" algn="just" defTabSz="1306266" fontAlgn="base">
+            <a:pPr marL="342900" indent="-342900" algn="just" defTabSz="1306266" fontAlgn="base">
               <a:spcBef>
                 <a:spcPct val="0"/>
               </a:spcBef>
               <a:spcAft>
                 <a:spcPct val="0"/>
               </a:spcAft>
-              <a:buFont typeface="Arial" charset="0"/>
+              <a:buFont typeface="Arial" panose="020B0604020202020204" pitchFamily="34" charset="0"/>
               <a:buChar char="•"/>
             </a:pPr>
             <a:r>
@@ -5633,8 +5271,1135 @@
                 <a:ea typeface="Helvetica" charset="0"/>
                 <a:cs typeface="Helvetica" charset="0"/>
               </a:rPr>
-              <a:t>Text</a:t>
-            </a:r>
+              <a:t>Requires large amount of hand-labelled data</a:t>
+            </a:r>
+          </a:p>
+          <a:p>
+            <a:pPr marL="342900" indent="-342900" algn="just" defTabSz="1306266" fontAlgn="base">
+              <a:spcBef>
+                <a:spcPct val="0"/>
+              </a:spcBef>
+              <a:spcAft>
+                <a:spcPct val="0"/>
+              </a:spcAft>
+              <a:buFont typeface="Arial" panose="020B0604020202020204" pitchFamily="34" charset="0"/>
+              <a:buChar char="•"/>
+            </a:pPr>
+            <a:r>
+              <a:rPr lang="en-US" sz="2500" dirty="0">
+                <a:solidFill>
+                  <a:srgbClr val="000000"/>
+                </a:solidFill>
+                <a:latin typeface="Helvetica" charset="0"/>
+                <a:ea typeface="Helvetica" charset="0"/>
+                <a:cs typeface="Helvetica" charset="0"/>
+              </a:rPr>
+              <a:t>Sparse, noisy and delayed rewards</a:t>
+            </a:r>
+          </a:p>
+          <a:p>
+            <a:pPr marL="342900" indent="-342900" algn="just" defTabSz="1306266" fontAlgn="base">
+              <a:spcBef>
+                <a:spcPct val="0"/>
+              </a:spcBef>
+              <a:spcAft>
+                <a:spcPct val="0"/>
+              </a:spcAft>
+              <a:buFont typeface="Arial" panose="020B0604020202020204" pitchFamily="34" charset="0"/>
+              <a:buChar char="•"/>
+            </a:pPr>
+            <a:r>
+              <a:rPr lang="en-US" sz="2500" dirty="0">
+                <a:solidFill>
+                  <a:srgbClr val="000000"/>
+                </a:solidFill>
+                <a:latin typeface="Helvetica" charset="0"/>
+                <a:ea typeface="Helvetica" charset="0"/>
+                <a:cs typeface="Helvetica" charset="0"/>
+              </a:rPr>
+              <a:t>Highly correlated sequence of states</a:t>
+            </a:r>
+          </a:p>
+        </p:txBody>
+      </p:sp>
+      <p:grpSp>
+        <p:nvGrpSpPr>
+          <p:cNvPr id="77" name="Group 76">
+            <a:extLst>
+              <a:ext uri="{FF2B5EF4-FFF2-40B4-BE49-F238E27FC236}">
+                <a16:creationId xmlns:a16="http://schemas.microsoft.com/office/drawing/2014/main" id="{ABCFFBEA-8F35-4E5B-AF28-E37E5962021A}"/>
+              </a:ext>
+            </a:extLst>
+          </p:cNvPr>
+          <p:cNvGrpSpPr/>
+          <p:nvPr/>
+        </p:nvGrpSpPr>
+        <p:grpSpPr>
+          <a:xfrm>
+            <a:off x="470970" y="13251344"/>
+            <a:ext cx="7384834" cy="2313204"/>
+            <a:chOff x="1225373" y="13243993"/>
+            <a:chExt cx="7384834" cy="2313204"/>
+          </a:xfrm>
+        </p:grpSpPr>
+        <p:grpSp>
+          <p:nvGrpSpPr>
+            <p:cNvPr id="3" name="Group 2">
+              <a:extLst>
+                <a:ext uri="{FF2B5EF4-FFF2-40B4-BE49-F238E27FC236}">
+                  <a16:creationId xmlns:a16="http://schemas.microsoft.com/office/drawing/2014/main" id="{634559A1-2389-479F-B367-938FFF77CB70}"/>
+                </a:ext>
+              </a:extLst>
+            </p:cNvPr>
+            <p:cNvGrpSpPr/>
+            <p:nvPr/>
+          </p:nvGrpSpPr>
+          <p:grpSpPr>
+            <a:xfrm>
+              <a:off x="1225373" y="13243993"/>
+              <a:ext cx="7384834" cy="1828800"/>
+              <a:chOff x="1225373" y="13243993"/>
+              <a:chExt cx="7384834" cy="1828800"/>
+            </a:xfrm>
+          </p:grpSpPr>
+          <p:pic>
+            <p:nvPicPr>
+              <p:cNvPr id="39" name="Picture 38" descr="Screen Clipping"/>
+              <p:cNvPicPr/>
+              <p:nvPr/>
+            </p:nvPicPr>
+            <p:blipFill>
+              <a:blip r:embed="rId3" cstate="print">
+                <a:extLst>
+                  <a:ext uri="{28A0092B-C50C-407E-A947-70E740481C1C}">
+                    <a14:useLocalDpi xmlns:a14="http://schemas.microsoft.com/office/drawing/2010/main" val="0"/>
+                  </a:ext>
+                </a:extLst>
+              </a:blip>
+              <a:stretch>
+                <a:fillRect/>
+              </a:stretch>
+            </p:blipFill>
+            <p:spPr>
+              <a:xfrm>
+                <a:off x="6324207" y="13243993"/>
+                <a:ext cx="2286000" cy="1828800"/>
+              </a:xfrm>
+              <a:prstGeom prst="rect">
+                <a:avLst/>
+              </a:prstGeom>
+            </p:spPr>
+          </p:pic>
+          <p:pic>
+            <p:nvPicPr>
+              <p:cNvPr id="43" name="Picture 42" descr="Screen Clipping">
+                <a:extLst>
+                  <a:ext uri="{FF2B5EF4-FFF2-40B4-BE49-F238E27FC236}">
+                    <a16:creationId xmlns:a16="http://schemas.microsoft.com/office/drawing/2014/main" id="{DA478377-7F18-4D22-9257-4A35348F9F45}"/>
+                  </a:ext>
+                </a:extLst>
+              </p:cNvPr>
+              <p:cNvPicPr/>
+              <p:nvPr/>
+            </p:nvPicPr>
+            <p:blipFill>
+              <a:blip r:embed="rId4">
+                <a:extLst>
+                  <a:ext uri="{28A0092B-C50C-407E-A947-70E740481C1C}">
+                    <a14:useLocalDpi xmlns:a14="http://schemas.microsoft.com/office/drawing/2010/main" val="0"/>
+                  </a:ext>
+                </a:extLst>
+              </a:blip>
+              <a:stretch>
+                <a:fillRect/>
+              </a:stretch>
+            </p:blipFill>
+            <p:spPr>
+              <a:xfrm>
+                <a:off x="1225373" y="13243993"/>
+                <a:ext cx="2286000" cy="1828800"/>
+              </a:xfrm>
+              <a:prstGeom prst="rect">
+                <a:avLst/>
+              </a:prstGeom>
+            </p:spPr>
+          </p:pic>
+          <p:pic>
+            <p:nvPicPr>
+              <p:cNvPr id="46" name="Picture 45" descr="Screen Clipping">
+                <a:extLst>
+                  <a:ext uri="{FF2B5EF4-FFF2-40B4-BE49-F238E27FC236}">
+                    <a16:creationId xmlns:a16="http://schemas.microsoft.com/office/drawing/2014/main" id="{383F1392-E66F-496A-9CEF-152607E60CF3}"/>
+                  </a:ext>
+                </a:extLst>
+              </p:cNvPr>
+              <p:cNvPicPr/>
+              <p:nvPr/>
+            </p:nvPicPr>
+            <p:blipFill>
+              <a:blip r:embed="rId5">
+                <a:extLst>
+                  <a:ext uri="{28A0092B-C50C-407E-A947-70E740481C1C}">
+                    <a14:useLocalDpi xmlns:a14="http://schemas.microsoft.com/office/drawing/2010/main" val="0"/>
+                  </a:ext>
+                </a:extLst>
+              </a:blip>
+              <a:stretch>
+                <a:fillRect/>
+              </a:stretch>
+            </p:blipFill>
+            <p:spPr>
+              <a:xfrm>
+                <a:off x="3790234" y="13243993"/>
+                <a:ext cx="2286000" cy="1828800"/>
+              </a:xfrm>
+              <a:prstGeom prst="rect">
+                <a:avLst/>
+              </a:prstGeom>
+            </p:spPr>
+          </p:pic>
+        </p:grpSp>
+        <p:sp>
+          <p:nvSpPr>
+            <p:cNvPr id="6" name="TextBox 5">
+              <a:extLst>
+                <a:ext uri="{FF2B5EF4-FFF2-40B4-BE49-F238E27FC236}">
+                  <a16:creationId xmlns:a16="http://schemas.microsoft.com/office/drawing/2014/main" id="{97C44178-A76E-4E3B-A0F5-FF2E0F82A44B}"/>
+                </a:ext>
+              </a:extLst>
+            </p:cNvPr>
+            <p:cNvSpPr txBox="1"/>
+            <p:nvPr/>
+          </p:nvSpPr>
+          <p:spPr>
+            <a:xfrm>
+              <a:off x="1791730" y="15072793"/>
+              <a:ext cx="1173892" cy="477054"/>
+            </a:xfrm>
+            <a:prstGeom prst="rect">
+              <a:avLst/>
+            </a:prstGeom>
+            <a:noFill/>
+          </p:spPr>
+          <p:txBody>
+            <a:bodyPr wrap="square" rtlCol="0">
+              <a:spAutoFit/>
+            </a:bodyPr>
+            <a:lstStyle/>
+            <a:p>
+              <a:pPr algn="ctr"/>
+              <a:r>
+                <a:rPr lang="en-US" sz="2500" dirty="0">
+                  <a:solidFill>
+                    <a:srgbClr val="000000"/>
+                  </a:solidFill>
+                  <a:latin typeface="Helvetica" charset="0"/>
+                  <a:cs typeface="Helvetica" charset="0"/>
+                </a:rPr>
+                <a:t>Pong</a:t>
+              </a:r>
+            </a:p>
+          </p:txBody>
+        </p:sp>
+        <p:sp>
+          <p:nvSpPr>
+            <p:cNvPr id="47" name="TextBox 46">
+              <a:extLst>
+                <a:ext uri="{FF2B5EF4-FFF2-40B4-BE49-F238E27FC236}">
+                  <a16:creationId xmlns:a16="http://schemas.microsoft.com/office/drawing/2014/main" id="{80D2FEBF-A827-4C45-A673-45A440B3B480}"/>
+                </a:ext>
+              </a:extLst>
+            </p:cNvPr>
+            <p:cNvSpPr txBox="1"/>
+            <p:nvPr/>
+          </p:nvSpPr>
+          <p:spPr>
+            <a:xfrm>
+              <a:off x="4166899" y="15080143"/>
+              <a:ext cx="1532669" cy="477054"/>
+            </a:xfrm>
+            <a:prstGeom prst="rect">
+              <a:avLst/>
+            </a:prstGeom>
+            <a:noFill/>
+          </p:spPr>
+          <p:txBody>
+            <a:bodyPr wrap="square" rtlCol="0">
+              <a:spAutoFit/>
+            </a:bodyPr>
+            <a:lstStyle/>
+            <a:p>
+              <a:pPr algn="ctr"/>
+              <a:r>
+                <a:rPr lang="en-US" sz="2500" dirty="0">
+                  <a:solidFill>
+                    <a:srgbClr val="000000"/>
+                  </a:solidFill>
+                  <a:latin typeface="Helvetica" charset="0"/>
+                  <a:cs typeface="Helvetica" charset="0"/>
+                </a:rPr>
+                <a:t>Breakout</a:t>
+              </a:r>
+            </a:p>
+          </p:txBody>
+        </p:sp>
+        <p:sp>
+          <p:nvSpPr>
+            <p:cNvPr id="48" name="TextBox 47">
+              <a:extLst>
+                <a:ext uri="{FF2B5EF4-FFF2-40B4-BE49-F238E27FC236}">
+                  <a16:creationId xmlns:a16="http://schemas.microsoft.com/office/drawing/2014/main" id="{509014E5-F720-4E01-A22C-3A45CD0B989C}"/>
+                </a:ext>
+              </a:extLst>
+            </p:cNvPr>
+            <p:cNvSpPr txBox="1"/>
+            <p:nvPr/>
+          </p:nvSpPr>
+          <p:spPr>
+            <a:xfrm>
+              <a:off x="6622529" y="15059802"/>
+              <a:ext cx="1726436" cy="477054"/>
+            </a:xfrm>
+            <a:prstGeom prst="rect">
+              <a:avLst/>
+            </a:prstGeom>
+            <a:noFill/>
+          </p:spPr>
+          <p:txBody>
+            <a:bodyPr wrap="square" rtlCol="0">
+              <a:spAutoFit/>
+            </a:bodyPr>
+            <a:lstStyle/>
+            <a:p>
+              <a:pPr algn="ctr"/>
+              <a:r>
+                <a:rPr lang="en-US" sz="2500" dirty="0">
+                  <a:solidFill>
+                    <a:srgbClr val="000000"/>
+                  </a:solidFill>
+                  <a:latin typeface="Helvetica" charset="0"/>
+                  <a:cs typeface="Helvetica" charset="0"/>
+                </a:rPr>
+                <a:t>Ice hockey</a:t>
+              </a:r>
+            </a:p>
+          </p:txBody>
+        </p:sp>
+      </p:grpSp>
+      <p:grpSp>
+        <p:nvGrpSpPr>
+          <p:cNvPr id="60" name="Group 59">
+            <a:extLst>
+              <a:ext uri="{FF2B5EF4-FFF2-40B4-BE49-F238E27FC236}">
+                <a16:creationId xmlns:a16="http://schemas.microsoft.com/office/drawing/2014/main" id="{796FB82C-D06F-493C-BA4D-397CAC27C89D}"/>
+              </a:ext>
+            </a:extLst>
+          </p:cNvPr>
+          <p:cNvGrpSpPr/>
+          <p:nvPr/>
+        </p:nvGrpSpPr>
+        <p:grpSpPr>
+          <a:xfrm>
+            <a:off x="8415038" y="11746360"/>
+            <a:ext cx="12018167" cy="6216629"/>
+            <a:chOff x="9421261" y="12424751"/>
+            <a:chExt cx="11113266" cy="5437403"/>
+          </a:xfrm>
+        </p:grpSpPr>
+        <p:pic>
+          <p:nvPicPr>
+            <p:cNvPr id="56" name="Picture 55">
+              <a:extLst>
+                <a:ext uri="{FF2B5EF4-FFF2-40B4-BE49-F238E27FC236}">
+                  <a16:creationId xmlns:a16="http://schemas.microsoft.com/office/drawing/2014/main" id="{EAF67C7E-2A55-428A-8DE2-652A40ED3964}"/>
+                </a:ext>
+              </a:extLst>
+            </p:cNvPr>
+            <p:cNvPicPr>
+              <a:picLocks noChangeAspect="1"/>
+            </p:cNvPicPr>
+            <p:nvPr/>
+          </p:nvPicPr>
+          <p:blipFill>
+            <a:blip r:embed="rId6"/>
+            <a:stretch>
+              <a:fillRect/>
+            </a:stretch>
+          </p:blipFill>
+          <p:spPr>
+            <a:xfrm>
+              <a:off x="16821228" y="12424751"/>
+              <a:ext cx="3713299" cy="2743200"/>
+            </a:xfrm>
+            <a:prstGeom prst="rect">
+              <a:avLst/>
+            </a:prstGeom>
+          </p:spPr>
+        </p:pic>
+        <p:pic>
+          <p:nvPicPr>
+            <p:cNvPr id="58" name="Picture 57">
+              <a:extLst>
+                <a:ext uri="{FF2B5EF4-FFF2-40B4-BE49-F238E27FC236}">
+                  <a16:creationId xmlns:a16="http://schemas.microsoft.com/office/drawing/2014/main" id="{5185E9F7-12E4-48A0-930B-2C6DF8443E91}"/>
+                </a:ext>
+              </a:extLst>
+            </p:cNvPr>
+            <p:cNvPicPr>
+              <a:picLocks noChangeAspect="1"/>
+            </p:cNvPicPr>
+            <p:nvPr/>
+          </p:nvPicPr>
+          <p:blipFill>
+            <a:blip r:embed="rId7"/>
+            <a:stretch>
+              <a:fillRect/>
+            </a:stretch>
+          </p:blipFill>
+          <p:spPr>
+            <a:xfrm>
+              <a:off x="16821228" y="15118954"/>
+              <a:ext cx="3713299" cy="2743200"/>
+            </a:xfrm>
+            <a:prstGeom prst="rect">
+              <a:avLst/>
+            </a:prstGeom>
+          </p:spPr>
+        </p:pic>
+        <p:pic>
+          <p:nvPicPr>
+            <p:cNvPr id="62" name="Picture 61">
+              <a:extLst>
+                <a:ext uri="{FF2B5EF4-FFF2-40B4-BE49-F238E27FC236}">
+                  <a16:creationId xmlns:a16="http://schemas.microsoft.com/office/drawing/2014/main" id="{9D06B21F-2030-4D52-A55F-0459344ABA9C}"/>
+                </a:ext>
+              </a:extLst>
+            </p:cNvPr>
+            <p:cNvPicPr>
+              <a:picLocks noChangeAspect="1"/>
+            </p:cNvPicPr>
+            <p:nvPr/>
+          </p:nvPicPr>
+          <p:blipFill>
+            <a:blip r:embed="rId8"/>
+            <a:stretch>
+              <a:fillRect/>
+            </a:stretch>
+          </p:blipFill>
+          <p:spPr>
+            <a:xfrm>
+              <a:off x="9421261" y="12424751"/>
+              <a:ext cx="3713299" cy="2743200"/>
+            </a:xfrm>
+            <a:prstGeom prst="rect">
+              <a:avLst/>
+            </a:prstGeom>
+          </p:spPr>
+        </p:pic>
+        <p:pic>
+          <p:nvPicPr>
+            <p:cNvPr id="63" name="Picture 62">
+              <a:extLst>
+                <a:ext uri="{FF2B5EF4-FFF2-40B4-BE49-F238E27FC236}">
+                  <a16:creationId xmlns:a16="http://schemas.microsoft.com/office/drawing/2014/main" id="{1CAF2AAC-6E3E-45C0-84E6-176F7E5E224C}"/>
+                </a:ext>
+              </a:extLst>
+            </p:cNvPr>
+            <p:cNvPicPr>
+              <a:picLocks noChangeAspect="1"/>
+            </p:cNvPicPr>
+            <p:nvPr/>
+          </p:nvPicPr>
+          <p:blipFill>
+            <a:blip r:embed="rId9"/>
+            <a:stretch>
+              <a:fillRect/>
+            </a:stretch>
+          </p:blipFill>
+          <p:spPr>
+            <a:xfrm>
+              <a:off x="9421261" y="15118954"/>
+              <a:ext cx="3713299" cy="2743200"/>
+            </a:xfrm>
+            <a:prstGeom prst="rect">
+              <a:avLst/>
+            </a:prstGeom>
+          </p:spPr>
+        </p:pic>
+        <p:pic>
+          <p:nvPicPr>
+            <p:cNvPr id="64" name="Picture 63">
+              <a:extLst>
+                <a:ext uri="{FF2B5EF4-FFF2-40B4-BE49-F238E27FC236}">
+                  <a16:creationId xmlns:a16="http://schemas.microsoft.com/office/drawing/2014/main" id="{4FBF8F95-5A21-4AED-BBC7-01A21A9340E1}"/>
+                </a:ext>
+              </a:extLst>
+            </p:cNvPr>
+            <p:cNvPicPr>
+              <a:picLocks noChangeAspect="1"/>
+            </p:cNvPicPr>
+            <p:nvPr/>
+          </p:nvPicPr>
+          <p:blipFill>
+            <a:blip r:embed="rId10"/>
+            <a:stretch>
+              <a:fillRect/>
+            </a:stretch>
+          </p:blipFill>
+          <p:spPr>
+            <a:xfrm>
+              <a:off x="13153165" y="12424751"/>
+              <a:ext cx="3713299" cy="2743200"/>
+            </a:xfrm>
+            <a:prstGeom prst="rect">
+              <a:avLst/>
+            </a:prstGeom>
+          </p:spPr>
+        </p:pic>
+        <p:pic>
+          <p:nvPicPr>
+            <p:cNvPr id="65" name="Picture 64">
+              <a:extLst>
+                <a:ext uri="{FF2B5EF4-FFF2-40B4-BE49-F238E27FC236}">
+                  <a16:creationId xmlns:a16="http://schemas.microsoft.com/office/drawing/2014/main" id="{7898A120-6B26-4A95-BB09-94CDDCEDF2E7}"/>
+                </a:ext>
+              </a:extLst>
+            </p:cNvPr>
+            <p:cNvPicPr>
+              <a:picLocks noChangeAspect="1"/>
+            </p:cNvPicPr>
+            <p:nvPr/>
+          </p:nvPicPr>
+          <p:blipFill>
+            <a:blip r:embed="rId11"/>
+            <a:stretch>
+              <a:fillRect/>
+            </a:stretch>
+          </p:blipFill>
+          <p:spPr>
+            <a:xfrm>
+              <a:off x="13153165" y="15118954"/>
+              <a:ext cx="3713299" cy="2743200"/>
+            </a:xfrm>
+            <a:prstGeom prst="rect">
+              <a:avLst/>
+            </a:prstGeom>
+          </p:spPr>
+        </p:pic>
+      </p:grpSp>
+      <p:sp>
+        <p:nvSpPr>
+          <p:cNvPr id="75" name="Subtitle 3">
+            <a:extLst>
+              <a:ext uri="{FF2B5EF4-FFF2-40B4-BE49-F238E27FC236}">
+                <a16:creationId xmlns:a16="http://schemas.microsoft.com/office/drawing/2014/main" id="{ED6BD2D5-209D-4A1A-8265-874F16B74856}"/>
+              </a:ext>
+            </a:extLst>
+          </p:cNvPr>
+          <p:cNvSpPr txBox="1">
+            <a:spLocks/>
+          </p:cNvSpPr>
+          <p:nvPr/>
+        </p:nvSpPr>
+        <p:spPr>
+          <a:xfrm>
+            <a:off x="8415038" y="10152571"/>
+            <a:ext cx="12204984" cy="840007"/>
+          </a:xfrm>
+          <a:prstGeom prst="rect">
+            <a:avLst/>
+          </a:prstGeom>
+        </p:spPr>
+        <p:txBody>
+          <a:bodyPr vert="horz" wrap="square" lIns="0" tIns="45720" rIns="0" bIns="45720" rtlCol="0">
+            <a:noAutofit/>
+          </a:bodyPr>
+          <a:lstStyle>
+            <a:lvl1pPr marL="0" indent="0" algn="ctr" defTabSz="1219215" rtl="0" eaLnBrk="1" fontAlgn="base" hangingPunct="1">
+              <a:spcBef>
+                <a:spcPct val="20000"/>
+              </a:spcBef>
+              <a:spcAft>
+                <a:spcPct val="0"/>
+              </a:spcAft>
+              <a:buClr>
+                <a:schemeClr val="bg2"/>
+              </a:buClr>
+              <a:buFont typeface="Wingdings" charset="2"/>
+              <a:buNone/>
+              <a:defRPr sz="5333" kern="1200" cap="small" spc="800">
+                <a:solidFill>
+                  <a:srgbClr val="A4001D"/>
+                </a:solidFill>
+                <a:latin typeface="Arial"/>
+                <a:ea typeface="ＭＳ Ｐゴシック" charset="0"/>
+                <a:cs typeface="ＭＳ Ｐゴシック" charset="0"/>
+              </a:defRPr>
+            </a:lvl1pPr>
+            <a:lvl2pPr marL="1219215" indent="0" algn="ctr" defTabSz="1219215" rtl="0" eaLnBrk="1" fontAlgn="base" hangingPunct="1">
+              <a:spcBef>
+                <a:spcPct val="20000"/>
+              </a:spcBef>
+              <a:spcAft>
+                <a:spcPct val="0"/>
+              </a:spcAft>
+              <a:buClr>
+                <a:schemeClr val="bg2"/>
+              </a:buClr>
+              <a:buFont typeface="Wingdings" charset="2"/>
+              <a:buNone/>
+              <a:defRPr kern="1200">
+                <a:solidFill>
+                  <a:schemeClr val="tx1">
+                    <a:tint val="75000"/>
+                  </a:schemeClr>
+                </a:solidFill>
+                <a:latin typeface="Arial"/>
+                <a:ea typeface="ＭＳ Ｐゴシック" charset="0"/>
+                <a:cs typeface="+mn-cs"/>
+              </a:defRPr>
+            </a:lvl2pPr>
+            <a:lvl3pPr marL="2438430" indent="0" algn="ctr" defTabSz="1219215" rtl="0" eaLnBrk="1" fontAlgn="base" hangingPunct="1">
+              <a:spcBef>
+                <a:spcPct val="20000"/>
+              </a:spcBef>
+              <a:spcAft>
+                <a:spcPct val="0"/>
+              </a:spcAft>
+              <a:buClr>
+                <a:schemeClr val="bg2"/>
+              </a:buClr>
+              <a:buSzPct val="102000"/>
+              <a:buFont typeface="Source Sans Pro" charset="0"/>
+              <a:buNone/>
+              <a:defRPr kern="1200">
+                <a:solidFill>
+                  <a:schemeClr val="tx1">
+                    <a:tint val="75000"/>
+                  </a:schemeClr>
+                </a:solidFill>
+                <a:latin typeface="Arial"/>
+                <a:ea typeface="ＭＳ Ｐゴシック" charset="0"/>
+                <a:cs typeface="+mn-cs"/>
+              </a:defRPr>
+            </a:lvl3pPr>
+            <a:lvl4pPr marL="3657646" indent="0" algn="ctr" defTabSz="1219215" rtl="0" eaLnBrk="1" fontAlgn="base" hangingPunct="1">
+              <a:spcBef>
+                <a:spcPct val="20000"/>
+              </a:spcBef>
+              <a:spcAft>
+                <a:spcPct val="0"/>
+              </a:spcAft>
+              <a:buClr>
+                <a:schemeClr val="bg2"/>
+              </a:buClr>
+              <a:buFont typeface="Arial" charset="0"/>
+              <a:buNone/>
+              <a:defRPr kern="1200">
+                <a:solidFill>
+                  <a:schemeClr val="tx1">
+                    <a:tint val="75000"/>
+                  </a:schemeClr>
+                </a:solidFill>
+                <a:latin typeface="Arial"/>
+                <a:ea typeface="ＭＳ Ｐゴシック" charset="0"/>
+                <a:cs typeface="+mn-cs"/>
+              </a:defRPr>
+            </a:lvl4pPr>
+            <a:lvl5pPr marL="4876861" indent="0" algn="ctr" defTabSz="1219215" rtl="0" eaLnBrk="1" fontAlgn="base" hangingPunct="1">
+              <a:spcBef>
+                <a:spcPct val="20000"/>
+              </a:spcBef>
+              <a:spcAft>
+                <a:spcPct val="0"/>
+              </a:spcAft>
+              <a:buClr>
+                <a:schemeClr val="bg2"/>
+              </a:buClr>
+              <a:buFont typeface="Source Sans Pro" charset="0"/>
+              <a:buNone/>
+              <a:defRPr kern="1200">
+                <a:solidFill>
+                  <a:schemeClr val="tx1">
+                    <a:tint val="75000"/>
+                  </a:schemeClr>
+                </a:solidFill>
+                <a:latin typeface="Arial"/>
+                <a:ea typeface="ＭＳ Ｐゴシック" charset="0"/>
+                <a:cs typeface="+mn-cs"/>
+              </a:defRPr>
+            </a:lvl5pPr>
+            <a:lvl6pPr marL="6096076" indent="0" algn="ctr" defTabSz="1219215" rtl="0" eaLnBrk="1" latinLnBrk="0" hangingPunct="1">
+              <a:spcBef>
+                <a:spcPct val="20000"/>
+              </a:spcBef>
+              <a:buFont typeface="Arial"/>
+              <a:buNone/>
+              <a:defRPr sz="5333" kern="1200">
+                <a:solidFill>
+                  <a:schemeClr val="tx1">
+                    <a:tint val="75000"/>
+                  </a:schemeClr>
+                </a:solidFill>
+                <a:latin typeface="+mn-lt"/>
+                <a:ea typeface="+mn-ea"/>
+                <a:cs typeface="+mn-cs"/>
+              </a:defRPr>
+            </a:lvl6pPr>
+            <a:lvl7pPr marL="7315291" indent="0" algn="ctr" defTabSz="1219215" rtl="0" eaLnBrk="1" latinLnBrk="0" hangingPunct="1">
+              <a:spcBef>
+                <a:spcPct val="20000"/>
+              </a:spcBef>
+              <a:buFont typeface="Arial"/>
+              <a:buNone/>
+              <a:defRPr sz="5333" kern="1200">
+                <a:solidFill>
+                  <a:schemeClr val="tx1">
+                    <a:tint val="75000"/>
+                  </a:schemeClr>
+                </a:solidFill>
+                <a:latin typeface="+mn-lt"/>
+                <a:ea typeface="+mn-ea"/>
+                <a:cs typeface="+mn-cs"/>
+              </a:defRPr>
+            </a:lvl7pPr>
+            <a:lvl8pPr marL="8534507" indent="0" algn="ctr" defTabSz="1219215" rtl="0" eaLnBrk="1" latinLnBrk="0" hangingPunct="1">
+              <a:spcBef>
+                <a:spcPct val="20000"/>
+              </a:spcBef>
+              <a:buFont typeface="Arial"/>
+              <a:buNone/>
+              <a:defRPr sz="5333" kern="1200">
+                <a:solidFill>
+                  <a:schemeClr val="tx1">
+                    <a:tint val="75000"/>
+                  </a:schemeClr>
+                </a:solidFill>
+                <a:latin typeface="+mn-lt"/>
+                <a:ea typeface="+mn-ea"/>
+                <a:cs typeface="+mn-cs"/>
+              </a:defRPr>
+            </a:lvl8pPr>
+            <a:lvl9pPr marL="9753722" indent="0" algn="ctr" defTabSz="1219215" rtl="0" eaLnBrk="1" latinLnBrk="0" hangingPunct="1">
+              <a:spcBef>
+                <a:spcPct val="20000"/>
+              </a:spcBef>
+              <a:buFont typeface="Arial"/>
+              <a:buNone/>
+              <a:defRPr sz="5333" kern="1200">
+                <a:solidFill>
+                  <a:schemeClr val="tx1">
+                    <a:tint val="75000"/>
+                  </a:schemeClr>
+                </a:solidFill>
+                <a:latin typeface="+mn-lt"/>
+                <a:ea typeface="+mn-ea"/>
+                <a:cs typeface="+mn-cs"/>
+              </a:defRPr>
+            </a:lvl9pPr>
+          </a:lstStyle>
+          <a:p>
+            <a:pPr fontAlgn="auto">
+              <a:spcBef>
+                <a:spcPts val="600"/>
+              </a:spcBef>
+              <a:spcAft>
+                <a:spcPts val="0"/>
+              </a:spcAft>
+              <a:buClr>
+                <a:srgbClr val="8C1515"/>
+              </a:buClr>
+              <a:defRPr/>
+            </a:pPr>
+            <a:r>
+              <a:rPr lang="en-US" sz="4000" spc="300" dirty="0">
+                <a:solidFill>
+                  <a:srgbClr val="8C1515"/>
+                </a:solidFill>
+                <a:ea typeface=""/>
+                <a:cs typeface=""/>
+              </a:rPr>
+              <a:t>Result</a:t>
+            </a:r>
+          </a:p>
+        </p:txBody>
+      </p:sp>
+      <p:grpSp>
+        <p:nvGrpSpPr>
+          <p:cNvPr id="84" name="Group 83">
+            <a:extLst>
+              <a:ext uri="{FF2B5EF4-FFF2-40B4-BE49-F238E27FC236}">
+                <a16:creationId xmlns:a16="http://schemas.microsoft.com/office/drawing/2014/main" id="{3C6C7E79-4016-4671-A30B-18065F0B2182}"/>
+              </a:ext>
+            </a:extLst>
+          </p:cNvPr>
+          <p:cNvGrpSpPr/>
+          <p:nvPr/>
+        </p:nvGrpSpPr>
+        <p:grpSpPr>
+          <a:xfrm>
+            <a:off x="8347557" y="4244735"/>
+            <a:ext cx="13847591" cy="5418591"/>
+            <a:chOff x="10267460" y="4916228"/>
+            <a:chExt cx="13847591" cy="5418591"/>
+          </a:xfrm>
+        </p:grpSpPr>
+        <p:pic>
+          <p:nvPicPr>
+            <p:cNvPr id="10" name="Picture 9">
+              <a:extLst>
+                <a:ext uri="{FF2B5EF4-FFF2-40B4-BE49-F238E27FC236}">
+                  <a16:creationId xmlns:a16="http://schemas.microsoft.com/office/drawing/2014/main" id="{762902B4-DC4C-486A-8A64-BFC0B5E38A5A}"/>
+                </a:ext>
+              </a:extLst>
+            </p:cNvPr>
+            <p:cNvPicPr>
+              <a:picLocks noChangeAspect="1"/>
+            </p:cNvPicPr>
+            <p:nvPr/>
+          </p:nvPicPr>
+          <p:blipFill>
+            <a:blip r:embed="rId12"/>
+            <a:stretch>
+              <a:fillRect/>
+            </a:stretch>
+          </p:blipFill>
+          <p:spPr>
+            <a:xfrm>
+              <a:off x="12966824" y="4916228"/>
+              <a:ext cx="3515183" cy="4572000"/>
+            </a:xfrm>
+            <a:prstGeom prst="rect">
+              <a:avLst/>
+            </a:prstGeom>
+          </p:spPr>
+        </p:pic>
+        <p:pic>
+          <p:nvPicPr>
+            <p:cNvPr id="12" name="Picture 11">
+              <a:extLst>
+                <a:ext uri="{FF2B5EF4-FFF2-40B4-BE49-F238E27FC236}">
+                  <a16:creationId xmlns:a16="http://schemas.microsoft.com/office/drawing/2014/main" id="{EB33FC19-C7E6-47ED-859C-70E433DA7FE2}"/>
+                </a:ext>
+              </a:extLst>
+            </p:cNvPr>
+            <p:cNvPicPr>
+              <a:picLocks noChangeAspect="1"/>
+            </p:cNvPicPr>
+            <p:nvPr/>
+          </p:nvPicPr>
+          <p:blipFill>
+            <a:blip r:embed="rId13"/>
+            <a:stretch>
+              <a:fillRect/>
+            </a:stretch>
+          </p:blipFill>
+          <p:spPr>
+            <a:xfrm>
+              <a:off x="16731864" y="4916228"/>
+              <a:ext cx="3515182" cy="4572000"/>
+            </a:xfrm>
+            <a:prstGeom prst="rect">
+              <a:avLst/>
+            </a:prstGeom>
+          </p:spPr>
+        </p:pic>
+        <p:pic>
+          <p:nvPicPr>
+            <p:cNvPr id="14" name="Picture 13">
+              <a:extLst>
+                <a:ext uri="{FF2B5EF4-FFF2-40B4-BE49-F238E27FC236}">
+                  <a16:creationId xmlns:a16="http://schemas.microsoft.com/office/drawing/2014/main" id="{20FDAC25-5BEC-45FE-B342-CD8874E231EF}"/>
+                </a:ext>
+              </a:extLst>
+            </p:cNvPr>
+            <p:cNvPicPr>
+              <a:picLocks noChangeAspect="1"/>
+            </p:cNvPicPr>
+            <p:nvPr/>
+          </p:nvPicPr>
+          <p:blipFill>
+            <a:blip r:embed="rId14"/>
+            <a:stretch>
+              <a:fillRect/>
+            </a:stretch>
+          </p:blipFill>
+          <p:spPr>
+            <a:xfrm>
+              <a:off x="20591164" y="4916228"/>
+              <a:ext cx="3523887" cy="4572000"/>
+            </a:xfrm>
+            <a:prstGeom prst="rect">
+              <a:avLst/>
+            </a:prstGeom>
+          </p:spPr>
+        </p:pic>
+        <p:pic>
+          <p:nvPicPr>
+            <p:cNvPr id="49" name="Picture 48">
+              <a:extLst>
+                <a:ext uri="{FF2B5EF4-FFF2-40B4-BE49-F238E27FC236}">
+                  <a16:creationId xmlns:a16="http://schemas.microsoft.com/office/drawing/2014/main" id="{99427170-08EB-4675-AB3C-B95F5D620A4F}"/>
+                </a:ext>
+              </a:extLst>
+            </p:cNvPr>
+            <p:cNvPicPr>
+              <a:picLocks noChangeAspect="1"/>
+            </p:cNvPicPr>
+            <p:nvPr/>
+          </p:nvPicPr>
+          <p:blipFill>
+            <a:blip r:embed="rId15"/>
+            <a:stretch>
+              <a:fillRect/>
+            </a:stretch>
+          </p:blipFill>
+          <p:spPr>
+            <a:xfrm>
+              <a:off x="10267460" y="4916228"/>
+              <a:ext cx="2370538" cy="4572000"/>
+            </a:xfrm>
+            <a:prstGeom prst="rect">
+              <a:avLst/>
+            </a:prstGeom>
+          </p:spPr>
+        </p:pic>
+        <p:sp>
+          <p:nvSpPr>
+            <p:cNvPr id="79" name="TextBox 78">
+              <a:extLst>
+                <a:ext uri="{FF2B5EF4-FFF2-40B4-BE49-F238E27FC236}">
+                  <a16:creationId xmlns:a16="http://schemas.microsoft.com/office/drawing/2014/main" id="{4CE36101-CD81-4BA9-B839-4787C1BF7301}"/>
+                </a:ext>
+              </a:extLst>
+            </p:cNvPr>
+            <p:cNvSpPr txBox="1"/>
+            <p:nvPr/>
+          </p:nvSpPr>
+          <p:spPr>
+            <a:xfrm>
+              <a:off x="10589511" y="9473045"/>
+              <a:ext cx="1726436" cy="477054"/>
+            </a:xfrm>
+            <a:prstGeom prst="rect">
+              <a:avLst/>
+            </a:prstGeom>
+            <a:noFill/>
+          </p:spPr>
+          <p:txBody>
+            <a:bodyPr wrap="square" rtlCol="0">
+              <a:spAutoFit/>
+            </a:bodyPr>
+            <a:lstStyle/>
+            <a:p>
+              <a:pPr algn="ctr"/>
+              <a:r>
+                <a:rPr lang="en-US" sz="2500" dirty="0">
+                  <a:solidFill>
+                    <a:srgbClr val="000000"/>
+                  </a:solidFill>
+                  <a:latin typeface="Helvetica" charset="0"/>
+                  <a:cs typeface="Helvetica" charset="0"/>
+                </a:rPr>
+                <a:t>A3C</a:t>
+              </a:r>
+            </a:p>
+          </p:txBody>
+        </p:sp>
+        <p:sp>
+          <p:nvSpPr>
+            <p:cNvPr id="80" name="TextBox 79">
+              <a:extLst>
+                <a:ext uri="{FF2B5EF4-FFF2-40B4-BE49-F238E27FC236}">
+                  <a16:creationId xmlns:a16="http://schemas.microsoft.com/office/drawing/2014/main" id="{FE666EA9-690C-4D57-9BE5-87D0647ED772}"/>
+                </a:ext>
+              </a:extLst>
+            </p:cNvPr>
+            <p:cNvSpPr txBox="1"/>
+            <p:nvPr/>
+          </p:nvSpPr>
+          <p:spPr>
+            <a:xfrm>
+              <a:off x="13716000" y="9473045"/>
+              <a:ext cx="1988403" cy="477054"/>
+            </a:xfrm>
+            <a:prstGeom prst="rect">
+              <a:avLst/>
+            </a:prstGeom>
+            <a:noFill/>
+          </p:spPr>
+          <p:txBody>
+            <a:bodyPr wrap="square" rtlCol="0">
+              <a:spAutoFit/>
+            </a:bodyPr>
+            <a:lstStyle/>
+            <a:p>
+              <a:pPr algn="ctr"/>
+              <a:r>
+                <a:rPr lang="en-US" sz="2500" dirty="0">
+                  <a:solidFill>
+                    <a:srgbClr val="000000"/>
+                  </a:solidFill>
+                  <a:latin typeface="Helvetica" charset="0"/>
+                  <a:cs typeface="Helvetica" charset="0"/>
+                </a:rPr>
+                <a:t>Double A3C</a:t>
+              </a:r>
+            </a:p>
+          </p:txBody>
+        </p:sp>
+        <p:sp>
+          <p:nvSpPr>
+            <p:cNvPr id="81" name="TextBox 80">
+              <a:extLst>
+                <a:ext uri="{FF2B5EF4-FFF2-40B4-BE49-F238E27FC236}">
+                  <a16:creationId xmlns:a16="http://schemas.microsoft.com/office/drawing/2014/main" id="{C770770A-BF46-4BB0-B476-C30C5406D328}"/>
+                </a:ext>
+              </a:extLst>
+            </p:cNvPr>
+            <p:cNvSpPr txBox="1"/>
+            <p:nvPr/>
+          </p:nvSpPr>
+          <p:spPr>
+            <a:xfrm>
+              <a:off x="17495254" y="9473045"/>
+              <a:ext cx="1988403" cy="861774"/>
+            </a:xfrm>
+            <a:prstGeom prst="rect">
+              <a:avLst/>
+            </a:prstGeom>
+            <a:noFill/>
+          </p:spPr>
+          <p:txBody>
+            <a:bodyPr wrap="square" rtlCol="0">
+              <a:spAutoFit/>
+            </a:bodyPr>
+            <a:lstStyle/>
+            <a:p>
+              <a:pPr algn="ctr"/>
+              <a:r>
+                <a:rPr lang="en-US" sz="2500" dirty="0">
+                  <a:solidFill>
+                    <a:srgbClr val="000000"/>
+                  </a:solidFill>
+                  <a:latin typeface="Helvetica" charset="0"/>
+                  <a:cs typeface="Helvetica" charset="0"/>
+                </a:rPr>
+                <a:t>Less Shared Double A3C</a:t>
+              </a:r>
+            </a:p>
+          </p:txBody>
+        </p:sp>
+        <p:sp>
+          <p:nvSpPr>
+            <p:cNvPr id="82" name="TextBox 81">
+              <a:extLst>
+                <a:ext uri="{FF2B5EF4-FFF2-40B4-BE49-F238E27FC236}">
+                  <a16:creationId xmlns:a16="http://schemas.microsoft.com/office/drawing/2014/main" id="{E237C14E-3F91-4036-A2FB-2D3040F63D93}"/>
+                </a:ext>
+              </a:extLst>
+            </p:cNvPr>
+            <p:cNvSpPr txBox="1"/>
+            <p:nvPr/>
+          </p:nvSpPr>
+          <p:spPr>
+            <a:xfrm>
+              <a:off x="21358906" y="9473045"/>
+              <a:ext cx="1988403" cy="861774"/>
+            </a:xfrm>
+            <a:prstGeom prst="rect">
+              <a:avLst/>
+            </a:prstGeom>
+            <a:noFill/>
+          </p:spPr>
+          <p:txBody>
+            <a:bodyPr wrap="square" rtlCol="0">
+              <a:spAutoFit/>
+            </a:bodyPr>
+            <a:lstStyle/>
+            <a:p>
+              <a:pPr algn="ctr"/>
+              <a:r>
+                <a:rPr lang="en-US" sz="2500" dirty="0">
+                  <a:solidFill>
+                    <a:srgbClr val="000000"/>
+                  </a:solidFill>
+                  <a:latin typeface="Helvetica" charset="0"/>
+                  <a:cs typeface="Helvetica" charset="0"/>
+                </a:rPr>
+                <a:t>No Shared Double A3C</a:t>
+              </a:r>
+            </a:p>
+          </p:txBody>
+        </p:sp>
+      </p:grpSp>
+      <p:sp>
+        <p:nvSpPr>
+          <p:cNvPr id="85" name="TextBox 84">
+            <a:extLst>
+              <a:ext uri="{FF2B5EF4-FFF2-40B4-BE49-F238E27FC236}">
+                <a16:creationId xmlns:a16="http://schemas.microsoft.com/office/drawing/2014/main" id="{A2ECDB31-62FA-4B20-96C3-F979620C6E32}"/>
+              </a:ext>
+            </a:extLst>
+          </p:cNvPr>
+          <p:cNvSpPr txBox="1"/>
+          <p:nvPr/>
+        </p:nvSpPr>
+        <p:spPr>
+          <a:xfrm>
+            <a:off x="8361874" y="10832391"/>
+            <a:ext cx="12204984" cy="1246495"/>
+          </a:xfrm>
+          <a:prstGeom prst="rect">
+            <a:avLst/>
+          </a:prstGeom>
+          <a:noFill/>
+        </p:spPr>
+        <p:txBody>
+          <a:bodyPr wrap="square" rtlCol="0">
+            <a:spAutoFit/>
+          </a:bodyPr>
+          <a:lstStyle/>
+          <a:p>
+            <a:pPr marL="342900" indent="-342900" defTabSz="1306266" fontAlgn="base">
+              <a:spcBef>
+                <a:spcPct val="0"/>
+              </a:spcBef>
+              <a:spcAft>
+                <a:spcPct val="0"/>
+              </a:spcAft>
+              <a:buFont typeface="Arial" panose="020B0604020202020204" pitchFamily="34" charset="0"/>
+              <a:buChar char="•"/>
+            </a:pPr>
+            <a:r>
+              <a:rPr lang="en-US" sz="2500" dirty="0">
+                <a:solidFill>
+                  <a:srgbClr val="000000"/>
+                </a:solidFill>
+                <a:latin typeface="Helvetica" charset="0"/>
+                <a:ea typeface="Helvetica" charset="0"/>
+                <a:cs typeface="Helvetica" charset="0"/>
+              </a:rPr>
+              <a:t>Evaluated the performance by comparing average score over each epoch and over training time</a:t>
+            </a:r>
+          </a:p>
+          <a:p>
+            <a:pPr defTabSz="1306266" fontAlgn="base">
+              <a:spcBef>
+                <a:spcPct val="0"/>
+              </a:spcBef>
+              <a:spcAft>
+                <a:spcPct val="0"/>
+              </a:spcAft>
+            </a:pPr>
+            <a:endParaRPr lang="en-US" sz="2500" dirty="0">
+              <a:solidFill>
+                <a:srgbClr val="000000"/>
+              </a:solidFill>
+              <a:latin typeface="Helvetica" charset="0"/>
+              <a:ea typeface="Helvetica" charset="0"/>
+              <a:cs typeface="Helvetica" charset="0"/>
+            </a:endParaRPr>
           </a:p>
         </p:txBody>
       </p:sp>

</xml_diff>

<commit_message>
output pdf and update poster with video link
</commit_message>
<xml_diff>
--- a/report/posterCS234.pptx
+++ b/report/posterCS234.pptx
@@ -254,7 +254,7 @@
           <a:p>
             <a:fld id="{4BE766CC-D96B-4446-A146-6E49321225B2}" type="datetimeFigureOut">
               <a:rPr lang="en-US" smtClean="0"/>
-              <a:t>3/13/2018</a:t>
+              <a:t>3/14/2018</a:t>
             </a:fld>
             <a:endParaRPr lang="en-US"/>
           </a:p>
@@ -419,7 +419,7 @@
           <a:p>
             <a:fld id="{4BE766CC-D96B-4446-A146-6E49321225B2}" type="datetimeFigureOut">
               <a:rPr lang="en-US" smtClean="0"/>
-              <a:t>3/13/2018</a:t>
+              <a:t>3/14/2018</a:t>
             </a:fld>
             <a:endParaRPr lang="en-US"/>
           </a:p>
@@ -594,7 +594,7 @@
           <a:p>
             <a:fld id="{4BE766CC-D96B-4446-A146-6E49321225B2}" type="datetimeFigureOut">
               <a:rPr lang="en-US" smtClean="0"/>
-              <a:t>3/13/2018</a:t>
+              <a:t>3/14/2018</a:t>
             </a:fld>
             <a:endParaRPr lang="en-US"/>
           </a:p>
@@ -759,7 +759,7 @@
           <a:p>
             <a:fld id="{4BE766CC-D96B-4446-A146-6E49321225B2}" type="datetimeFigureOut">
               <a:rPr lang="en-US" smtClean="0"/>
-              <a:t>3/13/2018</a:t>
+              <a:t>3/14/2018</a:t>
             </a:fld>
             <a:endParaRPr lang="en-US"/>
           </a:p>
@@ -998,7 +998,7 @@
           <a:p>
             <a:fld id="{4BE766CC-D96B-4446-A146-6E49321225B2}" type="datetimeFigureOut">
               <a:rPr lang="en-US" smtClean="0"/>
-              <a:t>3/13/2018</a:t>
+              <a:t>3/14/2018</a:t>
             </a:fld>
             <a:endParaRPr lang="en-US"/>
           </a:p>
@@ -1225,7 +1225,7 @@
           <a:p>
             <a:fld id="{4BE766CC-D96B-4446-A146-6E49321225B2}" type="datetimeFigureOut">
               <a:rPr lang="en-US" smtClean="0"/>
-              <a:t>3/13/2018</a:t>
+              <a:t>3/14/2018</a:t>
             </a:fld>
             <a:endParaRPr lang="en-US"/>
           </a:p>
@@ -1587,7 +1587,7 @@
           <a:p>
             <a:fld id="{4BE766CC-D96B-4446-A146-6E49321225B2}" type="datetimeFigureOut">
               <a:rPr lang="en-US" smtClean="0"/>
-              <a:t>3/13/2018</a:t>
+              <a:t>3/14/2018</a:t>
             </a:fld>
             <a:endParaRPr lang="en-US"/>
           </a:p>
@@ -1700,7 +1700,7 @@
           <a:p>
             <a:fld id="{4BE766CC-D96B-4446-A146-6E49321225B2}" type="datetimeFigureOut">
               <a:rPr lang="en-US" smtClean="0"/>
-              <a:t>3/13/2018</a:t>
+              <a:t>3/14/2018</a:t>
             </a:fld>
             <a:endParaRPr lang="en-US"/>
           </a:p>
@@ -1790,7 +1790,7 @@
           <a:p>
             <a:fld id="{4BE766CC-D96B-4446-A146-6E49321225B2}" type="datetimeFigureOut">
               <a:rPr lang="en-US" smtClean="0"/>
-              <a:t>3/13/2018</a:t>
+              <a:t>3/14/2018</a:t>
             </a:fld>
             <a:endParaRPr lang="en-US"/>
           </a:p>
@@ -2062,7 +2062,7 @@
           <a:p>
             <a:fld id="{4BE766CC-D96B-4446-A146-6E49321225B2}" type="datetimeFigureOut">
               <a:rPr lang="en-US" smtClean="0"/>
-              <a:t>3/13/2018</a:t>
+              <a:t>3/14/2018</a:t>
             </a:fld>
             <a:endParaRPr lang="en-US"/>
           </a:p>
@@ -2314,7 +2314,7 @@
           <a:p>
             <a:fld id="{4BE766CC-D96B-4446-A146-6E49321225B2}" type="datetimeFigureOut">
               <a:rPr lang="en-US" smtClean="0"/>
-              <a:t>3/13/2018</a:t>
+              <a:t>3/14/2018</a:t>
             </a:fld>
             <a:endParaRPr lang="en-US"/>
           </a:p>
@@ -2522,7 +2522,7 @@
           <a:p>
             <a:fld id="{4BE766CC-D96B-4446-A146-6E49321225B2}" type="datetimeFigureOut">
               <a:rPr lang="en-US" smtClean="0"/>
-              <a:t>3/13/2018</a:t>
+              <a:t>3/14/2018</a:t>
             </a:fld>
             <a:endParaRPr lang="en-US"/>
           </a:p>
@@ -2992,27 +2992,23 @@
                 </a:solidFill>
                 <a:latin typeface="Helvetica" pitchFamily="34" charset="0"/>
               </a:rPr>
-              <a:t>Lingjie Kong, </a:t>
-            </a:r>
-            <a:r>
-              <a:rPr kumimoji="0" lang="en-US" altLang="zh-TW" sz="5000" dirty="0" err="1">
+              <a:t>Lingjie Kong, Ruixuan Ren</a:t>
+            </a:r>
+          </a:p>
+          <a:p>
+            <a:pPr algn="ctr" defTabSz="5877992">
+              <a:defRPr/>
+            </a:pPr>
+            <a:r>
+              <a:rPr lang="en-US" altLang="zh-TW" sz="2000" dirty="0">
                 <a:solidFill>
                   <a:srgbClr val="FFFFFF"/>
                 </a:solidFill>
                 <a:latin typeface="Helvetica" pitchFamily="34" charset="0"/>
               </a:rPr>
-              <a:t>Ruixuan</a:t>
-            </a:r>
-            <a:r>
-              <a:rPr kumimoji="0" lang="en-US" altLang="zh-TW" sz="5000" dirty="0">
-                <a:solidFill>
-                  <a:srgbClr val="FFFFFF"/>
-                </a:solidFill>
-                <a:latin typeface="Helvetica" pitchFamily="34" charset="0"/>
-              </a:rPr>
-              <a:t> Ren</a:t>
-            </a:r>
-            <a:endParaRPr kumimoji="0" lang="zh-TW" altLang="en-US" sz="5000" dirty="0">
+              <a:t>Video Link: https://drive.google.com/file/d/1nIwGI2CbrmnOKAOgaDvY4Rz6kFkhr9B9/view?usp=sharing</a:t>
+            </a:r>
+            <a:endParaRPr kumimoji="0" lang="zh-TW" altLang="en-US" sz="2000" dirty="0">
               <a:solidFill>
                 <a:srgbClr val="FFFFFF"/>
               </a:solidFill>
@@ -3056,14 +3052,14 @@
           </a:ln>
           <a:extLst>
             <a:ext uri="{909E8E84-426E-40dd-AFC4-6F175D3DCCD1}">
-              <a14:hiddenFill xmlns:a14="http://schemas.microsoft.com/office/drawing/2010/main" xmlns="">
+              <a14:hiddenFill xmlns="" xmlns:a14="http://schemas.microsoft.com/office/drawing/2010/main">
                 <a:solidFill>
                   <a:srgbClr val="FFFFFF"/>
                 </a:solidFill>
               </a14:hiddenFill>
             </a:ext>
             <a:ext uri="{91240B29-F687-4f45-9708-019B960494DF}">
-              <a14:hiddenLine xmlns:a14="http://schemas.microsoft.com/office/drawing/2010/main" xmlns="" w="9525">
+              <a14:hiddenLine xmlns="" xmlns:a14="http://schemas.microsoft.com/office/drawing/2010/main" w="9525">
                 <a:solidFill>
                   <a:srgbClr val="000000"/>
                 </a:solidFill>

</xml_diff>